<commit_message>
Latest slides and code
</commit_message>
<xml_diff>
--- a/PyRM.pptx
+++ b/PyRM.pptx
@@ -5,7 +5,7 @@
     <p:sldMasterId id="2147483708" r:id="rId1"/>
   </p:sldMasterIdLst>
   <p:notesMasterIdLst>
-    <p:notesMasterId r:id="rId20"/>
+    <p:notesMasterId r:id="rId26"/>
   </p:notesMasterIdLst>
   <p:sldIdLst>
     <p:sldId id="264" r:id="rId2"/>
@@ -24,8 +24,14 @@
     <p:sldId id="305" r:id="rId15"/>
     <p:sldId id="306" r:id="rId16"/>
     <p:sldId id="307" r:id="rId17"/>
-    <p:sldId id="262" r:id="rId18"/>
-    <p:sldId id="291" r:id="rId19"/>
+    <p:sldId id="308" r:id="rId18"/>
+    <p:sldId id="309" r:id="rId19"/>
+    <p:sldId id="310" r:id="rId20"/>
+    <p:sldId id="311" r:id="rId21"/>
+    <p:sldId id="312" r:id="rId22"/>
+    <p:sldId id="313" r:id="rId23"/>
+    <p:sldId id="262" r:id="rId24"/>
+    <p:sldId id="291" r:id="rId25"/>
   </p:sldIdLst>
   <p:sldSz cx="9144000" cy="6858000" type="screen4x3"/>
   <p:notesSz cx="6858000" cy="9144000"/>
@@ -552,6 +558,90 @@
     <p:extLst>
       <p:ext uri="{BB962C8B-B14F-4D97-AF65-F5344CB8AC3E}">
         <p14:creationId xmlns:p14="http://schemas.microsoft.com/office/powerpoint/2010/main" val="3053624038"/>
+      </p:ext>
+    </p:extLst>
+  </p:cSld>
+  <p:clrMapOvr>
+    <a:masterClrMapping/>
+  </p:clrMapOvr>
+</p:notes>
+</file>
+
+<file path=ppt/notesSlides/notesSlide2.xml><?xml version="1.0" encoding="utf-8"?>
+<p:notes xmlns:a="http://schemas.openxmlformats.org/drawingml/2006/main" xmlns:r="http://schemas.openxmlformats.org/officeDocument/2006/relationships" xmlns:p="http://schemas.openxmlformats.org/presentationml/2006/main">
+  <p:cSld>
+    <p:spTree>
+      <p:nvGrpSpPr>
+        <p:cNvPr id="1" name=""/>
+        <p:cNvGrpSpPr/>
+        <p:nvPr/>
+      </p:nvGrpSpPr>
+      <p:grpSpPr>
+        <a:xfrm>
+          <a:off x="0" y="0"/>
+          <a:ext cx="0" cy="0"/>
+          <a:chOff x="0" y="0"/>
+          <a:chExt cx="0" cy="0"/>
+        </a:xfrm>
+      </p:grpSpPr>
+      <p:sp>
+        <p:nvSpPr>
+          <p:cNvPr id="2" name="Slide Image Placeholder 1"/>
+          <p:cNvSpPr>
+            <a:spLocks noGrp="1" noRot="1" noChangeAspect="1"/>
+          </p:cNvSpPr>
+          <p:nvPr>
+            <p:ph type="sldImg"/>
+          </p:nvPr>
+        </p:nvSpPr>
+        <p:spPr/>
+      </p:sp>
+      <p:sp>
+        <p:nvSpPr>
+          <p:cNvPr id="3" name="Notes Placeholder 2"/>
+          <p:cNvSpPr>
+            <a:spLocks noGrp="1"/>
+          </p:cNvSpPr>
+          <p:nvPr>
+            <p:ph type="body" idx="1"/>
+          </p:nvPr>
+        </p:nvSpPr>
+        <p:spPr/>
+        <p:txBody>
+          <a:bodyPr/>
+          <a:lstStyle/>
+          <a:p>
+            <a:endParaRPr lang="en-US" dirty="0"/>
+          </a:p>
+        </p:txBody>
+      </p:sp>
+      <p:sp>
+        <p:nvSpPr>
+          <p:cNvPr id="4" name="Slide Number Placeholder 3"/>
+          <p:cNvSpPr>
+            <a:spLocks noGrp="1"/>
+          </p:cNvSpPr>
+          <p:nvPr>
+            <p:ph type="sldNum" sz="quarter" idx="10"/>
+          </p:nvPr>
+        </p:nvSpPr>
+        <p:spPr/>
+        <p:txBody>
+          <a:bodyPr/>
+          <a:lstStyle/>
+          <a:p>
+            <a:fld id="{A2D18D2C-0382-4652-BB2D-BF216FAEE6A4}" type="slidenum">
+              <a:rPr lang="en-US" smtClean="0"/>
+              <a:t>21</a:t>
+            </a:fld>
+            <a:endParaRPr lang="en-US"/>
+          </a:p>
+        </p:txBody>
+      </p:sp>
+    </p:spTree>
+    <p:extLst>
+      <p:ext uri="{BB962C8B-B14F-4D97-AF65-F5344CB8AC3E}">
+        <p14:creationId xmlns:p14="http://schemas.microsoft.com/office/powerpoint/2010/main" val="1522184167"/>
       </p:ext>
     </p:extLst>
   </p:cSld>
@@ -3795,11 +3885,7 @@
           <a:p>
             <a:r>
               <a:rPr lang="en-US" dirty="0" smtClean="0"/>
-              <a:t>Introduction to </a:t>
-            </a:r>
-            <a:r>
-              <a:rPr lang="en-US" dirty="0" smtClean="0"/>
-              <a:t>Pixar </a:t>
+              <a:t>Introduction to Pixar </a:t>
             </a:r>
             <a:r>
               <a:rPr lang="en-US" dirty="0" err="1" smtClean="0"/>
@@ -4351,7 +4437,6 @@
               <a:rPr lang="en-US" dirty="0"/>
               <a:t> World State</a:t>
             </a:r>
-            <a:endParaRPr lang="en-US" dirty="0"/>
           </a:p>
         </p:txBody>
       </p:sp>
@@ -5065,7 +5150,6 @@
               <a:rPr lang="en-US" dirty="0"/>
               <a:t> World State</a:t>
             </a:r>
-            <a:endParaRPr lang="en-US" dirty="0"/>
           </a:p>
         </p:txBody>
       </p:sp>
@@ -6147,6 +6231,2992 @@
           <a:lstStyle/>
           <a:p>
             <a:r>
+              <a:rPr lang="en-US" dirty="0" err="1" smtClean="0"/>
+              <a:t>PointPolygon</a:t>
+            </a:r>
+            <a:endParaRPr lang="en-US" dirty="0"/>
+          </a:p>
+        </p:txBody>
+      </p:sp>
+      <p:sp>
+        <p:nvSpPr>
+          <p:cNvPr id="3" name="Rectangle 2"/>
+          <p:cNvSpPr/>
+          <p:nvPr/>
+        </p:nvSpPr>
+        <p:spPr>
+          <a:xfrm>
+            <a:off x="457200" y="1752600"/>
+            <a:ext cx="7858125" cy="3046988"/>
+          </a:xfrm>
+          <a:prstGeom prst="rect">
+            <a:avLst/>
+          </a:prstGeom>
+        </p:spPr>
+        <p:txBody>
+          <a:bodyPr wrap="square">
+            <a:spAutoFit/>
+          </a:bodyPr>
+          <a:lstStyle/>
+          <a:p>
+            <a:r>
+              <a:rPr lang="en-US" sz="1600" dirty="0" err="1" smtClean="0">
+                <a:latin typeface="Verdana" pitchFamily="34" charset="0"/>
+                <a:ea typeface="Verdana" pitchFamily="34" charset="0"/>
+                <a:cs typeface="Verdana" pitchFamily="34" charset="0"/>
+              </a:rPr>
+              <a:t>nverts</a:t>
+            </a:r>
+            <a:r>
+              <a:rPr lang="en-US" sz="1600" dirty="0" smtClean="0">
+                <a:latin typeface="Verdana" pitchFamily="34" charset="0"/>
+                <a:ea typeface="Verdana" pitchFamily="34" charset="0"/>
+                <a:cs typeface="Verdana" pitchFamily="34" charset="0"/>
+              </a:rPr>
+              <a:t> </a:t>
+            </a:r>
+            <a:r>
+              <a:rPr lang="en-US" sz="1600" dirty="0">
+                <a:latin typeface="Verdana" pitchFamily="34" charset="0"/>
+                <a:ea typeface="Verdana" pitchFamily="34" charset="0"/>
+                <a:cs typeface="Verdana" pitchFamily="34" charset="0"/>
+              </a:rPr>
+              <a:t>= [</a:t>
+            </a:r>
+            <a:r>
+              <a:rPr lang="en-US" sz="1600" dirty="0">
+                <a:latin typeface="Verdana" pitchFamily="34" charset="0"/>
+                <a:ea typeface="Verdana" pitchFamily="34" charset="0"/>
+                <a:cs typeface="Verdana" pitchFamily="34" charset="0"/>
+              </a:rPr>
+              <a:t>4</a:t>
+            </a:r>
+            <a:r>
+              <a:rPr lang="en-US" sz="1600" dirty="0">
+                <a:latin typeface="Verdana" pitchFamily="34" charset="0"/>
+                <a:ea typeface="Verdana" pitchFamily="34" charset="0"/>
+                <a:cs typeface="Verdana" pitchFamily="34" charset="0"/>
+              </a:rPr>
+              <a:t>, </a:t>
+            </a:r>
+            <a:r>
+              <a:rPr lang="en-US" sz="1600" dirty="0">
+                <a:latin typeface="Verdana" pitchFamily="34" charset="0"/>
+                <a:ea typeface="Verdana" pitchFamily="34" charset="0"/>
+                <a:cs typeface="Verdana" pitchFamily="34" charset="0"/>
+              </a:rPr>
+              <a:t>4</a:t>
+            </a:r>
+            <a:r>
+              <a:rPr lang="en-US" sz="1600" dirty="0">
+                <a:latin typeface="Verdana" pitchFamily="34" charset="0"/>
+                <a:ea typeface="Verdana" pitchFamily="34" charset="0"/>
+                <a:cs typeface="Verdana" pitchFamily="34" charset="0"/>
+              </a:rPr>
+              <a:t>, </a:t>
+            </a:r>
+            <a:r>
+              <a:rPr lang="en-US" sz="1600" dirty="0">
+                <a:latin typeface="Verdana" pitchFamily="34" charset="0"/>
+                <a:ea typeface="Verdana" pitchFamily="34" charset="0"/>
+                <a:cs typeface="Verdana" pitchFamily="34" charset="0"/>
+              </a:rPr>
+              <a:t>4</a:t>
+            </a:r>
+            <a:r>
+              <a:rPr lang="en-US" sz="1600" dirty="0">
+                <a:latin typeface="Verdana" pitchFamily="34" charset="0"/>
+                <a:ea typeface="Verdana" pitchFamily="34" charset="0"/>
+                <a:cs typeface="Verdana" pitchFamily="34" charset="0"/>
+              </a:rPr>
+              <a:t>, </a:t>
+            </a:r>
+            <a:r>
+              <a:rPr lang="en-US" sz="1600" dirty="0">
+                <a:latin typeface="Verdana" pitchFamily="34" charset="0"/>
+                <a:ea typeface="Verdana" pitchFamily="34" charset="0"/>
+                <a:cs typeface="Verdana" pitchFamily="34" charset="0"/>
+              </a:rPr>
+              <a:t>4</a:t>
+            </a:r>
+            <a:r>
+              <a:rPr lang="en-US" sz="1600" dirty="0">
+                <a:latin typeface="Verdana" pitchFamily="34" charset="0"/>
+                <a:ea typeface="Verdana" pitchFamily="34" charset="0"/>
+                <a:cs typeface="Verdana" pitchFamily="34" charset="0"/>
+              </a:rPr>
+              <a:t>, </a:t>
+            </a:r>
+            <a:r>
+              <a:rPr lang="en-US" sz="1600" dirty="0">
+                <a:latin typeface="Verdana" pitchFamily="34" charset="0"/>
+                <a:ea typeface="Verdana" pitchFamily="34" charset="0"/>
+                <a:cs typeface="Verdana" pitchFamily="34" charset="0"/>
+              </a:rPr>
+              <a:t>4</a:t>
+            </a:r>
+            <a:r>
+              <a:rPr lang="en-US" sz="1600" dirty="0">
+                <a:latin typeface="Verdana" pitchFamily="34" charset="0"/>
+                <a:ea typeface="Verdana" pitchFamily="34" charset="0"/>
+                <a:cs typeface="Verdana" pitchFamily="34" charset="0"/>
+              </a:rPr>
+              <a:t>, </a:t>
+            </a:r>
+            <a:r>
+              <a:rPr lang="en-US" sz="1600" dirty="0">
+                <a:latin typeface="Verdana" pitchFamily="34" charset="0"/>
+                <a:ea typeface="Verdana" pitchFamily="34" charset="0"/>
+                <a:cs typeface="Verdana" pitchFamily="34" charset="0"/>
+              </a:rPr>
+              <a:t>4</a:t>
+            </a:r>
+            <a:r>
+              <a:rPr lang="en-US" sz="1600" dirty="0">
+                <a:latin typeface="Verdana" pitchFamily="34" charset="0"/>
+                <a:ea typeface="Verdana" pitchFamily="34" charset="0"/>
+                <a:cs typeface="Verdana" pitchFamily="34" charset="0"/>
+              </a:rPr>
+              <a:t>]</a:t>
+            </a:r>
+            <a:br>
+              <a:rPr lang="en-US" sz="1600" dirty="0">
+                <a:latin typeface="Verdana" pitchFamily="34" charset="0"/>
+                <a:ea typeface="Verdana" pitchFamily="34" charset="0"/>
+                <a:cs typeface="Verdana" pitchFamily="34" charset="0"/>
+              </a:rPr>
+            </a:br>
+            <a:r>
+              <a:rPr lang="en-US" sz="1600" dirty="0" smtClean="0">
+                <a:latin typeface="Verdana" pitchFamily="34" charset="0"/>
+                <a:ea typeface="Verdana" pitchFamily="34" charset="0"/>
+                <a:cs typeface="Verdana" pitchFamily="34" charset="0"/>
+              </a:rPr>
+              <a:t>indices </a:t>
+            </a:r>
+            <a:r>
+              <a:rPr lang="en-US" sz="1600" dirty="0">
+                <a:latin typeface="Verdana" pitchFamily="34" charset="0"/>
+                <a:ea typeface="Verdana" pitchFamily="34" charset="0"/>
+                <a:cs typeface="Verdana" pitchFamily="34" charset="0"/>
+              </a:rPr>
+              <a:t>= [</a:t>
+            </a:r>
+            <a:r>
+              <a:rPr lang="en-US" sz="1600" dirty="0">
+                <a:latin typeface="Verdana" pitchFamily="34" charset="0"/>
+                <a:ea typeface="Verdana" pitchFamily="34" charset="0"/>
+                <a:cs typeface="Verdana" pitchFamily="34" charset="0"/>
+              </a:rPr>
+              <a:t>0</a:t>
+            </a:r>
+            <a:r>
+              <a:rPr lang="en-US" sz="1600" dirty="0">
+                <a:latin typeface="Verdana" pitchFamily="34" charset="0"/>
+                <a:ea typeface="Verdana" pitchFamily="34" charset="0"/>
+                <a:cs typeface="Verdana" pitchFamily="34" charset="0"/>
+              </a:rPr>
+              <a:t>, </a:t>
+            </a:r>
+            <a:r>
+              <a:rPr lang="en-US" sz="1600" dirty="0">
+                <a:latin typeface="Verdana" pitchFamily="34" charset="0"/>
+                <a:ea typeface="Verdana" pitchFamily="34" charset="0"/>
+                <a:cs typeface="Verdana" pitchFamily="34" charset="0"/>
+              </a:rPr>
+              <a:t>1</a:t>
+            </a:r>
+            <a:r>
+              <a:rPr lang="en-US" sz="1600" dirty="0">
+                <a:latin typeface="Verdana" pitchFamily="34" charset="0"/>
+                <a:ea typeface="Verdana" pitchFamily="34" charset="0"/>
+                <a:cs typeface="Verdana" pitchFamily="34" charset="0"/>
+              </a:rPr>
+              <a:t>, </a:t>
+            </a:r>
+            <a:r>
+              <a:rPr lang="en-US" sz="1600" dirty="0">
+                <a:latin typeface="Verdana" pitchFamily="34" charset="0"/>
+                <a:ea typeface="Verdana" pitchFamily="34" charset="0"/>
+                <a:cs typeface="Verdana" pitchFamily="34" charset="0"/>
+              </a:rPr>
+              <a:t>3</a:t>
+            </a:r>
+            <a:r>
+              <a:rPr lang="en-US" sz="1600" dirty="0">
+                <a:latin typeface="Verdana" pitchFamily="34" charset="0"/>
+                <a:ea typeface="Verdana" pitchFamily="34" charset="0"/>
+                <a:cs typeface="Verdana" pitchFamily="34" charset="0"/>
+              </a:rPr>
+              <a:t>, </a:t>
+            </a:r>
+            <a:r>
+              <a:rPr lang="en-US" sz="1600" dirty="0">
+                <a:latin typeface="Verdana" pitchFamily="34" charset="0"/>
+                <a:ea typeface="Verdana" pitchFamily="34" charset="0"/>
+                <a:cs typeface="Verdana" pitchFamily="34" charset="0"/>
+              </a:rPr>
+              <a:t>2</a:t>
+            </a:r>
+            <a:r>
+              <a:rPr lang="en-US" sz="1600" dirty="0">
+                <a:latin typeface="Verdana" pitchFamily="34" charset="0"/>
+                <a:ea typeface="Verdana" pitchFamily="34" charset="0"/>
+                <a:cs typeface="Verdana" pitchFamily="34" charset="0"/>
+              </a:rPr>
+              <a:t>, </a:t>
+            </a:r>
+            <a:r>
+              <a:rPr lang="en-US" sz="1600" dirty="0">
+                <a:latin typeface="Verdana" pitchFamily="34" charset="0"/>
+                <a:ea typeface="Verdana" pitchFamily="34" charset="0"/>
+                <a:cs typeface="Verdana" pitchFamily="34" charset="0"/>
+              </a:rPr>
+              <a:t>2</a:t>
+            </a:r>
+            <a:r>
+              <a:rPr lang="en-US" sz="1600" dirty="0">
+                <a:latin typeface="Verdana" pitchFamily="34" charset="0"/>
+                <a:ea typeface="Verdana" pitchFamily="34" charset="0"/>
+                <a:cs typeface="Verdana" pitchFamily="34" charset="0"/>
+              </a:rPr>
+              <a:t>, </a:t>
+            </a:r>
+            <a:r>
+              <a:rPr lang="en-US" sz="1600" dirty="0">
+                <a:latin typeface="Verdana" pitchFamily="34" charset="0"/>
+                <a:ea typeface="Verdana" pitchFamily="34" charset="0"/>
+                <a:cs typeface="Verdana" pitchFamily="34" charset="0"/>
+              </a:rPr>
+              <a:t>3</a:t>
+            </a:r>
+            <a:r>
+              <a:rPr lang="en-US" sz="1600" dirty="0">
+                <a:latin typeface="Verdana" pitchFamily="34" charset="0"/>
+                <a:ea typeface="Verdana" pitchFamily="34" charset="0"/>
+                <a:cs typeface="Verdana" pitchFamily="34" charset="0"/>
+              </a:rPr>
+              <a:t>, </a:t>
+            </a:r>
+            <a:r>
+              <a:rPr lang="en-US" sz="1600" dirty="0">
+                <a:latin typeface="Verdana" pitchFamily="34" charset="0"/>
+                <a:ea typeface="Verdana" pitchFamily="34" charset="0"/>
+                <a:cs typeface="Verdana" pitchFamily="34" charset="0"/>
+              </a:rPr>
+              <a:t>5</a:t>
+            </a:r>
+            <a:r>
+              <a:rPr lang="en-US" sz="1600" dirty="0">
+                <a:latin typeface="Verdana" pitchFamily="34" charset="0"/>
+                <a:ea typeface="Verdana" pitchFamily="34" charset="0"/>
+                <a:cs typeface="Verdana" pitchFamily="34" charset="0"/>
+              </a:rPr>
+              <a:t>, </a:t>
+            </a:r>
+            <a:r>
+              <a:rPr lang="en-US" sz="1600" dirty="0">
+                <a:latin typeface="Verdana" pitchFamily="34" charset="0"/>
+                <a:ea typeface="Verdana" pitchFamily="34" charset="0"/>
+                <a:cs typeface="Verdana" pitchFamily="34" charset="0"/>
+              </a:rPr>
+              <a:t>4</a:t>
+            </a:r>
+            <a:r>
+              <a:rPr lang="en-US" sz="1600" dirty="0">
+                <a:latin typeface="Verdana" pitchFamily="34" charset="0"/>
+                <a:ea typeface="Verdana" pitchFamily="34" charset="0"/>
+                <a:cs typeface="Verdana" pitchFamily="34" charset="0"/>
+              </a:rPr>
+              <a:t>, </a:t>
+            </a:r>
+            <a:r>
+              <a:rPr lang="en-US" sz="1600" dirty="0">
+                <a:latin typeface="Verdana" pitchFamily="34" charset="0"/>
+                <a:ea typeface="Verdana" pitchFamily="34" charset="0"/>
+                <a:cs typeface="Verdana" pitchFamily="34" charset="0"/>
+              </a:rPr>
+              <a:t>4</a:t>
+            </a:r>
+            <a:r>
+              <a:rPr lang="en-US" sz="1600" dirty="0">
+                <a:latin typeface="Verdana" pitchFamily="34" charset="0"/>
+                <a:ea typeface="Verdana" pitchFamily="34" charset="0"/>
+                <a:cs typeface="Verdana" pitchFamily="34" charset="0"/>
+              </a:rPr>
+              <a:t>, </a:t>
+            </a:r>
+            <a:r>
+              <a:rPr lang="en-US" sz="1600" dirty="0">
+                <a:latin typeface="Verdana" pitchFamily="34" charset="0"/>
+                <a:ea typeface="Verdana" pitchFamily="34" charset="0"/>
+                <a:cs typeface="Verdana" pitchFamily="34" charset="0"/>
+              </a:rPr>
+              <a:t>5</a:t>
+            </a:r>
+            <a:r>
+              <a:rPr lang="en-US" sz="1600" dirty="0">
+                <a:latin typeface="Verdana" pitchFamily="34" charset="0"/>
+                <a:ea typeface="Verdana" pitchFamily="34" charset="0"/>
+                <a:cs typeface="Verdana" pitchFamily="34" charset="0"/>
+              </a:rPr>
+              <a:t>, </a:t>
+            </a:r>
+            <a:r>
+              <a:rPr lang="en-US" sz="1600" dirty="0">
+                <a:latin typeface="Verdana" pitchFamily="34" charset="0"/>
+                <a:ea typeface="Verdana" pitchFamily="34" charset="0"/>
+                <a:cs typeface="Verdana" pitchFamily="34" charset="0"/>
+              </a:rPr>
+              <a:t>7</a:t>
+            </a:r>
+            <a:r>
+              <a:rPr lang="en-US" sz="1600" dirty="0">
+                <a:latin typeface="Verdana" pitchFamily="34" charset="0"/>
+                <a:ea typeface="Verdana" pitchFamily="34" charset="0"/>
+                <a:cs typeface="Verdana" pitchFamily="34" charset="0"/>
+              </a:rPr>
+              <a:t>, </a:t>
+            </a:r>
+            <a:r>
+              <a:rPr lang="en-US" sz="1600" dirty="0">
+                <a:latin typeface="Verdana" pitchFamily="34" charset="0"/>
+                <a:ea typeface="Verdana" pitchFamily="34" charset="0"/>
+                <a:cs typeface="Verdana" pitchFamily="34" charset="0"/>
+              </a:rPr>
+              <a:t>6</a:t>
+            </a:r>
+            <a:r>
+              <a:rPr lang="en-US" sz="1600" dirty="0">
+                <a:latin typeface="Verdana" pitchFamily="34" charset="0"/>
+                <a:ea typeface="Verdana" pitchFamily="34" charset="0"/>
+                <a:cs typeface="Verdana" pitchFamily="34" charset="0"/>
+              </a:rPr>
+              <a:t>, </a:t>
+            </a:r>
+            <a:r>
+              <a:rPr lang="en-US" sz="1600" dirty="0">
+                <a:latin typeface="Verdana" pitchFamily="34" charset="0"/>
+                <a:ea typeface="Verdana" pitchFamily="34" charset="0"/>
+                <a:cs typeface="Verdana" pitchFamily="34" charset="0"/>
+              </a:rPr>
+              <a:t>6</a:t>
+            </a:r>
+            <a:r>
+              <a:rPr lang="en-US" sz="1600" dirty="0">
+                <a:latin typeface="Verdana" pitchFamily="34" charset="0"/>
+                <a:ea typeface="Verdana" pitchFamily="34" charset="0"/>
+                <a:cs typeface="Verdana" pitchFamily="34" charset="0"/>
+              </a:rPr>
+              <a:t>, </a:t>
+            </a:r>
+            <a:r>
+              <a:rPr lang="en-US" sz="1600" dirty="0">
+                <a:latin typeface="Verdana" pitchFamily="34" charset="0"/>
+                <a:ea typeface="Verdana" pitchFamily="34" charset="0"/>
+                <a:cs typeface="Verdana" pitchFamily="34" charset="0"/>
+              </a:rPr>
+              <a:t>7</a:t>
+            </a:r>
+            <a:r>
+              <a:rPr lang="en-US" sz="1600" dirty="0">
+                <a:latin typeface="Verdana" pitchFamily="34" charset="0"/>
+                <a:ea typeface="Verdana" pitchFamily="34" charset="0"/>
+                <a:cs typeface="Verdana" pitchFamily="34" charset="0"/>
+              </a:rPr>
+              <a:t>, </a:t>
+            </a:r>
+            <a:r>
+              <a:rPr lang="en-US" sz="1600" dirty="0">
+                <a:latin typeface="Verdana" pitchFamily="34" charset="0"/>
+                <a:ea typeface="Verdana" pitchFamily="34" charset="0"/>
+                <a:cs typeface="Verdana" pitchFamily="34" charset="0"/>
+              </a:rPr>
+              <a:t>1</a:t>
+            </a:r>
+            <a:r>
+              <a:rPr lang="en-US" sz="1600" dirty="0">
+                <a:latin typeface="Verdana" pitchFamily="34" charset="0"/>
+                <a:ea typeface="Verdana" pitchFamily="34" charset="0"/>
+                <a:cs typeface="Verdana" pitchFamily="34" charset="0"/>
+              </a:rPr>
+              <a:t>, </a:t>
+            </a:r>
+            <a:r>
+              <a:rPr lang="en-US" sz="1600" dirty="0">
+                <a:latin typeface="Verdana" pitchFamily="34" charset="0"/>
+                <a:ea typeface="Verdana" pitchFamily="34" charset="0"/>
+                <a:cs typeface="Verdana" pitchFamily="34" charset="0"/>
+              </a:rPr>
+              <a:t>0</a:t>
+            </a:r>
+            <a:r>
+              <a:rPr lang="en-US" sz="1600" dirty="0">
+                <a:latin typeface="Verdana" pitchFamily="34" charset="0"/>
+                <a:ea typeface="Verdana" pitchFamily="34" charset="0"/>
+                <a:cs typeface="Verdana" pitchFamily="34" charset="0"/>
+              </a:rPr>
+              <a:t>, </a:t>
+            </a:r>
+            <a:r>
+              <a:rPr lang="en-US" sz="1600" dirty="0">
+                <a:latin typeface="Verdana" pitchFamily="34" charset="0"/>
+                <a:ea typeface="Verdana" pitchFamily="34" charset="0"/>
+                <a:cs typeface="Verdana" pitchFamily="34" charset="0"/>
+              </a:rPr>
+              <a:t>1</a:t>
+            </a:r>
+            <a:r>
+              <a:rPr lang="en-US" sz="1600" dirty="0">
+                <a:latin typeface="Verdana" pitchFamily="34" charset="0"/>
+                <a:ea typeface="Verdana" pitchFamily="34" charset="0"/>
+                <a:cs typeface="Verdana" pitchFamily="34" charset="0"/>
+              </a:rPr>
+              <a:t>, </a:t>
+            </a:r>
+            <a:r>
+              <a:rPr lang="en-US" sz="1600" dirty="0">
+                <a:latin typeface="Verdana" pitchFamily="34" charset="0"/>
+                <a:ea typeface="Verdana" pitchFamily="34" charset="0"/>
+                <a:cs typeface="Verdana" pitchFamily="34" charset="0"/>
+              </a:rPr>
+              <a:t>7</a:t>
+            </a:r>
+            <a:r>
+              <a:rPr lang="en-US" sz="1600" dirty="0">
+                <a:latin typeface="Verdana" pitchFamily="34" charset="0"/>
+                <a:ea typeface="Verdana" pitchFamily="34" charset="0"/>
+                <a:cs typeface="Verdana" pitchFamily="34" charset="0"/>
+              </a:rPr>
+              <a:t>, </a:t>
+            </a:r>
+            <a:r>
+              <a:rPr lang="en-US" sz="1600" dirty="0">
+                <a:latin typeface="Verdana" pitchFamily="34" charset="0"/>
+                <a:ea typeface="Verdana" pitchFamily="34" charset="0"/>
+                <a:cs typeface="Verdana" pitchFamily="34" charset="0"/>
+              </a:rPr>
+              <a:t>5</a:t>
+            </a:r>
+            <a:r>
+              <a:rPr lang="en-US" sz="1600" dirty="0">
+                <a:latin typeface="Verdana" pitchFamily="34" charset="0"/>
+                <a:ea typeface="Verdana" pitchFamily="34" charset="0"/>
+                <a:cs typeface="Verdana" pitchFamily="34" charset="0"/>
+              </a:rPr>
+              <a:t>, </a:t>
+            </a:r>
+            <a:r>
+              <a:rPr lang="en-US" sz="1600" dirty="0">
+                <a:latin typeface="Verdana" pitchFamily="34" charset="0"/>
+                <a:ea typeface="Verdana" pitchFamily="34" charset="0"/>
+                <a:cs typeface="Verdana" pitchFamily="34" charset="0"/>
+              </a:rPr>
+              <a:t>3</a:t>
+            </a:r>
+            <a:r>
+              <a:rPr lang="en-US" sz="1600" dirty="0">
+                <a:latin typeface="Verdana" pitchFamily="34" charset="0"/>
+                <a:ea typeface="Verdana" pitchFamily="34" charset="0"/>
+                <a:cs typeface="Verdana" pitchFamily="34" charset="0"/>
+              </a:rPr>
+              <a:t>, </a:t>
+            </a:r>
+            <a:r>
+              <a:rPr lang="en-US" sz="1600" dirty="0">
+                <a:latin typeface="Verdana" pitchFamily="34" charset="0"/>
+                <a:ea typeface="Verdana" pitchFamily="34" charset="0"/>
+                <a:cs typeface="Verdana" pitchFamily="34" charset="0"/>
+              </a:rPr>
+              <a:t>6</a:t>
+            </a:r>
+            <a:r>
+              <a:rPr lang="en-US" sz="1600" dirty="0">
+                <a:latin typeface="Verdana" pitchFamily="34" charset="0"/>
+                <a:ea typeface="Verdana" pitchFamily="34" charset="0"/>
+                <a:cs typeface="Verdana" pitchFamily="34" charset="0"/>
+              </a:rPr>
+              <a:t>, </a:t>
+            </a:r>
+            <a:r>
+              <a:rPr lang="en-US" sz="1600" dirty="0">
+                <a:latin typeface="Verdana" pitchFamily="34" charset="0"/>
+                <a:ea typeface="Verdana" pitchFamily="34" charset="0"/>
+                <a:cs typeface="Verdana" pitchFamily="34" charset="0"/>
+              </a:rPr>
+              <a:t>0</a:t>
+            </a:r>
+            <a:r>
+              <a:rPr lang="en-US" sz="1600" dirty="0">
+                <a:latin typeface="Verdana" pitchFamily="34" charset="0"/>
+                <a:ea typeface="Verdana" pitchFamily="34" charset="0"/>
+                <a:cs typeface="Verdana" pitchFamily="34" charset="0"/>
+              </a:rPr>
+              <a:t>, </a:t>
+            </a:r>
+            <a:r>
+              <a:rPr lang="en-US" sz="1600" dirty="0">
+                <a:latin typeface="Verdana" pitchFamily="34" charset="0"/>
+                <a:ea typeface="Verdana" pitchFamily="34" charset="0"/>
+                <a:cs typeface="Verdana" pitchFamily="34" charset="0"/>
+              </a:rPr>
+              <a:t>2</a:t>
+            </a:r>
+            <a:r>
+              <a:rPr lang="en-US" sz="1600" dirty="0">
+                <a:latin typeface="Verdana" pitchFamily="34" charset="0"/>
+                <a:ea typeface="Verdana" pitchFamily="34" charset="0"/>
+                <a:cs typeface="Verdana" pitchFamily="34" charset="0"/>
+              </a:rPr>
+              <a:t>, </a:t>
+            </a:r>
+            <a:r>
+              <a:rPr lang="en-US" sz="1600" dirty="0">
+                <a:latin typeface="Verdana" pitchFamily="34" charset="0"/>
+                <a:ea typeface="Verdana" pitchFamily="34" charset="0"/>
+                <a:cs typeface="Verdana" pitchFamily="34" charset="0"/>
+              </a:rPr>
+              <a:t>4</a:t>
+            </a:r>
+            <a:r>
+              <a:rPr lang="en-US" sz="1600" dirty="0" smtClean="0">
+                <a:latin typeface="Verdana" pitchFamily="34" charset="0"/>
+                <a:ea typeface="Verdana" pitchFamily="34" charset="0"/>
+                <a:cs typeface="Verdana" pitchFamily="34" charset="0"/>
+              </a:rPr>
+              <a:t>]</a:t>
+            </a:r>
+          </a:p>
+          <a:p>
+            <a:r>
+              <a:rPr lang="en-US" sz="1600" dirty="0">
+                <a:latin typeface="Verdana" pitchFamily="34" charset="0"/>
+                <a:ea typeface="Verdana" pitchFamily="34" charset="0"/>
+                <a:cs typeface="Verdana" pitchFamily="34" charset="0"/>
+              </a:rPr>
+              <a:t/>
+            </a:r>
+            <a:br>
+              <a:rPr lang="en-US" sz="1600" dirty="0">
+                <a:latin typeface="Verdana" pitchFamily="34" charset="0"/>
+                <a:ea typeface="Verdana" pitchFamily="34" charset="0"/>
+                <a:cs typeface="Verdana" pitchFamily="34" charset="0"/>
+              </a:rPr>
+            </a:br>
+            <a:r>
+              <a:rPr lang="en-US" sz="1600" dirty="0" smtClean="0">
+                <a:latin typeface="Verdana" pitchFamily="34" charset="0"/>
+                <a:ea typeface="Verdana" pitchFamily="34" charset="0"/>
+                <a:cs typeface="Verdana" pitchFamily="34" charset="0"/>
+              </a:rPr>
+              <a:t>position </a:t>
+            </a:r>
+            <a:r>
+              <a:rPr lang="en-US" sz="1600" dirty="0">
+                <a:latin typeface="Verdana" pitchFamily="34" charset="0"/>
+                <a:ea typeface="Verdana" pitchFamily="34" charset="0"/>
+                <a:cs typeface="Verdana" pitchFamily="34" charset="0"/>
+              </a:rPr>
+              <a:t>= [-</a:t>
+            </a:r>
+            <a:r>
+              <a:rPr lang="en-US" sz="1600" dirty="0">
+                <a:latin typeface="Verdana" pitchFamily="34" charset="0"/>
+                <a:ea typeface="Verdana" pitchFamily="34" charset="0"/>
+                <a:cs typeface="Verdana" pitchFamily="34" charset="0"/>
+              </a:rPr>
+              <a:t>1.0</a:t>
+            </a:r>
+            <a:r>
+              <a:rPr lang="en-US" sz="1600" dirty="0">
+                <a:latin typeface="Verdana" pitchFamily="34" charset="0"/>
+                <a:ea typeface="Verdana" pitchFamily="34" charset="0"/>
+                <a:cs typeface="Verdana" pitchFamily="34" charset="0"/>
+              </a:rPr>
+              <a:t>, -</a:t>
+            </a:r>
+            <a:r>
+              <a:rPr lang="en-US" sz="1600" dirty="0">
+                <a:latin typeface="Verdana" pitchFamily="34" charset="0"/>
+                <a:ea typeface="Verdana" pitchFamily="34" charset="0"/>
+                <a:cs typeface="Verdana" pitchFamily="34" charset="0"/>
+              </a:rPr>
+              <a:t>1.0</a:t>
+            </a:r>
+            <a:r>
+              <a:rPr lang="en-US" sz="1600" dirty="0">
+                <a:latin typeface="Verdana" pitchFamily="34" charset="0"/>
+                <a:ea typeface="Verdana" pitchFamily="34" charset="0"/>
+                <a:cs typeface="Verdana" pitchFamily="34" charset="0"/>
+              </a:rPr>
+              <a:t>, </a:t>
+            </a:r>
+            <a:r>
+              <a:rPr lang="en-US" sz="1600" dirty="0">
+                <a:latin typeface="Verdana" pitchFamily="34" charset="0"/>
+                <a:ea typeface="Verdana" pitchFamily="34" charset="0"/>
+                <a:cs typeface="Verdana" pitchFamily="34" charset="0"/>
+              </a:rPr>
+              <a:t>1.0</a:t>
+            </a:r>
+            <a:r>
+              <a:rPr lang="en-US" sz="1600" dirty="0">
+                <a:latin typeface="Verdana" pitchFamily="34" charset="0"/>
+                <a:ea typeface="Verdana" pitchFamily="34" charset="0"/>
+                <a:cs typeface="Verdana" pitchFamily="34" charset="0"/>
+              </a:rPr>
+              <a:t>, </a:t>
+            </a:r>
+            <a:r>
+              <a:rPr lang="en-US" sz="1600" dirty="0" smtClean="0">
+                <a:latin typeface="Verdana" pitchFamily="34" charset="0"/>
+                <a:ea typeface="Verdana" pitchFamily="34" charset="0"/>
+                <a:cs typeface="Verdana" pitchFamily="34" charset="0"/>
+              </a:rPr>
+              <a:t>…. </a:t>
+            </a:r>
+            <a:r>
+              <a:rPr lang="en-US" sz="1600" dirty="0">
+                <a:latin typeface="Verdana" pitchFamily="34" charset="0"/>
+                <a:ea typeface="Verdana" pitchFamily="34" charset="0"/>
+                <a:cs typeface="Verdana" pitchFamily="34" charset="0"/>
+              </a:rPr>
+              <a:t>-</a:t>
+            </a:r>
+            <a:r>
+              <a:rPr lang="en-US" sz="1600" dirty="0">
+                <a:latin typeface="Verdana" pitchFamily="34" charset="0"/>
+                <a:ea typeface="Verdana" pitchFamily="34" charset="0"/>
+                <a:cs typeface="Verdana" pitchFamily="34" charset="0"/>
+              </a:rPr>
+              <a:t>1.0</a:t>
+            </a:r>
+            <a:r>
+              <a:rPr lang="en-US" sz="1600" dirty="0">
+                <a:latin typeface="Verdana" pitchFamily="34" charset="0"/>
+                <a:ea typeface="Verdana" pitchFamily="34" charset="0"/>
+                <a:cs typeface="Verdana" pitchFamily="34" charset="0"/>
+              </a:rPr>
+              <a:t>]</a:t>
+            </a:r>
+            <a:br>
+              <a:rPr lang="en-US" sz="1600" dirty="0">
+                <a:latin typeface="Verdana" pitchFamily="34" charset="0"/>
+                <a:ea typeface="Verdana" pitchFamily="34" charset="0"/>
+                <a:cs typeface="Verdana" pitchFamily="34" charset="0"/>
+              </a:rPr>
+            </a:br>
+            <a:r>
+              <a:rPr lang="en-US" sz="1600" dirty="0">
+                <a:latin typeface="Verdana" pitchFamily="34" charset="0"/>
+                <a:ea typeface="Verdana" pitchFamily="34" charset="0"/>
+                <a:cs typeface="Verdana" pitchFamily="34" charset="0"/>
+              </a:rPr>
+              <a:t>normal = [</a:t>
+            </a:r>
+            <a:r>
+              <a:rPr lang="en-US" sz="1600" dirty="0">
+                <a:latin typeface="Verdana" pitchFamily="34" charset="0"/>
+                <a:ea typeface="Verdana" pitchFamily="34" charset="0"/>
+                <a:cs typeface="Verdana" pitchFamily="34" charset="0"/>
+              </a:rPr>
+              <a:t>0</a:t>
+            </a:r>
+            <a:r>
+              <a:rPr lang="en-US" sz="1600" dirty="0">
+                <a:latin typeface="Verdana" pitchFamily="34" charset="0"/>
+                <a:ea typeface="Verdana" pitchFamily="34" charset="0"/>
+                <a:cs typeface="Verdana" pitchFamily="34" charset="0"/>
+              </a:rPr>
+              <a:t>, </a:t>
+            </a:r>
+            <a:r>
+              <a:rPr lang="en-US" sz="1600" dirty="0">
+                <a:latin typeface="Verdana" pitchFamily="34" charset="0"/>
+                <a:ea typeface="Verdana" pitchFamily="34" charset="0"/>
+                <a:cs typeface="Verdana" pitchFamily="34" charset="0"/>
+              </a:rPr>
+              <a:t>0</a:t>
+            </a:r>
+            <a:r>
+              <a:rPr lang="en-US" sz="1600" dirty="0">
+                <a:latin typeface="Verdana" pitchFamily="34" charset="0"/>
+                <a:ea typeface="Verdana" pitchFamily="34" charset="0"/>
+                <a:cs typeface="Verdana" pitchFamily="34" charset="0"/>
+              </a:rPr>
+              <a:t>, </a:t>
+            </a:r>
+            <a:r>
+              <a:rPr lang="en-US" sz="1600" dirty="0">
+                <a:latin typeface="Verdana" pitchFamily="34" charset="0"/>
+                <a:ea typeface="Verdana" pitchFamily="34" charset="0"/>
+                <a:cs typeface="Verdana" pitchFamily="34" charset="0"/>
+              </a:rPr>
+              <a:t>1</a:t>
+            </a:r>
+            <a:r>
+              <a:rPr lang="en-US" sz="1600" dirty="0">
+                <a:latin typeface="Verdana" pitchFamily="34" charset="0"/>
+                <a:ea typeface="Verdana" pitchFamily="34" charset="0"/>
+                <a:cs typeface="Verdana" pitchFamily="34" charset="0"/>
+              </a:rPr>
+              <a:t>, </a:t>
+            </a:r>
+            <a:r>
+              <a:rPr lang="en-US" sz="1600" dirty="0">
+                <a:latin typeface="Verdana" pitchFamily="34" charset="0"/>
+                <a:ea typeface="Verdana" pitchFamily="34" charset="0"/>
+                <a:cs typeface="Verdana" pitchFamily="34" charset="0"/>
+              </a:rPr>
+              <a:t>0</a:t>
+            </a:r>
+            <a:r>
+              <a:rPr lang="en-US" sz="1600" dirty="0">
+                <a:latin typeface="Verdana" pitchFamily="34" charset="0"/>
+                <a:ea typeface="Verdana" pitchFamily="34" charset="0"/>
+                <a:cs typeface="Verdana" pitchFamily="34" charset="0"/>
+              </a:rPr>
+              <a:t>, </a:t>
+            </a:r>
+            <a:r>
+              <a:rPr lang="en-US" sz="1600" dirty="0" smtClean="0">
+                <a:latin typeface="Verdana" pitchFamily="34" charset="0"/>
+                <a:ea typeface="Verdana" pitchFamily="34" charset="0"/>
+                <a:cs typeface="Verdana" pitchFamily="34" charset="0"/>
+              </a:rPr>
+              <a:t>…. -</a:t>
+            </a:r>
+            <a:r>
+              <a:rPr lang="en-US" sz="1600" dirty="0">
+                <a:latin typeface="Verdana" pitchFamily="34" charset="0"/>
+                <a:ea typeface="Verdana" pitchFamily="34" charset="0"/>
+                <a:cs typeface="Verdana" pitchFamily="34" charset="0"/>
+              </a:rPr>
+              <a:t>1</a:t>
+            </a:r>
+            <a:r>
+              <a:rPr lang="en-US" sz="1600" dirty="0">
+                <a:latin typeface="Verdana" pitchFamily="34" charset="0"/>
+                <a:ea typeface="Verdana" pitchFamily="34" charset="0"/>
+                <a:cs typeface="Verdana" pitchFamily="34" charset="0"/>
+              </a:rPr>
+              <a:t>, </a:t>
+            </a:r>
+            <a:r>
+              <a:rPr lang="en-US" sz="1600" dirty="0">
+                <a:latin typeface="Verdana" pitchFamily="34" charset="0"/>
+                <a:ea typeface="Verdana" pitchFamily="34" charset="0"/>
+                <a:cs typeface="Verdana" pitchFamily="34" charset="0"/>
+              </a:rPr>
+              <a:t>0</a:t>
+            </a:r>
+            <a:r>
+              <a:rPr lang="en-US" sz="1600" dirty="0">
+                <a:latin typeface="Verdana" pitchFamily="34" charset="0"/>
+                <a:ea typeface="Verdana" pitchFamily="34" charset="0"/>
+                <a:cs typeface="Verdana" pitchFamily="34" charset="0"/>
+              </a:rPr>
+              <a:t>, </a:t>
+            </a:r>
+            <a:r>
+              <a:rPr lang="en-US" sz="1600" dirty="0">
+                <a:latin typeface="Verdana" pitchFamily="34" charset="0"/>
+                <a:ea typeface="Verdana" pitchFamily="34" charset="0"/>
+                <a:cs typeface="Verdana" pitchFamily="34" charset="0"/>
+              </a:rPr>
+              <a:t>0</a:t>
+            </a:r>
+            <a:r>
+              <a:rPr lang="en-US" sz="1600" dirty="0">
+                <a:latin typeface="Verdana" pitchFamily="34" charset="0"/>
+                <a:ea typeface="Verdana" pitchFamily="34" charset="0"/>
+                <a:cs typeface="Verdana" pitchFamily="34" charset="0"/>
+              </a:rPr>
+              <a:t>]</a:t>
+            </a:r>
+            <a:br>
+              <a:rPr lang="en-US" sz="1600" dirty="0">
+                <a:latin typeface="Verdana" pitchFamily="34" charset="0"/>
+                <a:ea typeface="Verdana" pitchFamily="34" charset="0"/>
+                <a:cs typeface="Verdana" pitchFamily="34" charset="0"/>
+              </a:rPr>
+            </a:br>
+            <a:r>
+              <a:rPr lang="en-US" sz="1600" dirty="0" err="1">
+                <a:latin typeface="Verdana" pitchFamily="34" charset="0"/>
+                <a:ea typeface="Verdana" pitchFamily="34" charset="0"/>
+                <a:cs typeface="Verdana" pitchFamily="34" charset="0"/>
+              </a:rPr>
+              <a:t>texCoordS</a:t>
+            </a:r>
+            <a:r>
+              <a:rPr lang="en-US" sz="1600" dirty="0">
+                <a:latin typeface="Verdana" pitchFamily="34" charset="0"/>
+                <a:ea typeface="Verdana" pitchFamily="34" charset="0"/>
+                <a:cs typeface="Verdana" pitchFamily="34" charset="0"/>
+              </a:rPr>
+              <a:t> = [</a:t>
+            </a:r>
+            <a:r>
+              <a:rPr lang="en-US" sz="1600" dirty="0">
+                <a:latin typeface="Verdana" pitchFamily="34" charset="0"/>
+                <a:ea typeface="Verdana" pitchFamily="34" charset="0"/>
+                <a:cs typeface="Verdana" pitchFamily="34" charset="0"/>
+              </a:rPr>
+              <a:t>0.375</a:t>
+            </a:r>
+            <a:r>
+              <a:rPr lang="en-US" sz="1600" dirty="0">
+                <a:latin typeface="Verdana" pitchFamily="34" charset="0"/>
+                <a:ea typeface="Verdana" pitchFamily="34" charset="0"/>
+                <a:cs typeface="Verdana" pitchFamily="34" charset="0"/>
+              </a:rPr>
+              <a:t>, </a:t>
+            </a:r>
+            <a:r>
+              <a:rPr lang="en-US" sz="1600" dirty="0">
+                <a:latin typeface="Verdana" pitchFamily="34" charset="0"/>
+                <a:ea typeface="Verdana" pitchFamily="34" charset="0"/>
+                <a:cs typeface="Verdana" pitchFamily="34" charset="0"/>
+              </a:rPr>
+              <a:t>0.625</a:t>
+            </a:r>
+            <a:r>
+              <a:rPr lang="en-US" sz="1600" dirty="0">
+                <a:latin typeface="Verdana" pitchFamily="34" charset="0"/>
+                <a:ea typeface="Verdana" pitchFamily="34" charset="0"/>
+                <a:cs typeface="Verdana" pitchFamily="34" charset="0"/>
+              </a:rPr>
+              <a:t>, </a:t>
+            </a:r>
+            <a:r>
+              <a:rPr lang="en-US" sz="1600" dirty="0" smtClean="0">
+                <a:latin typeface="Verdana" pitchFamily="34" charset="0"/>
+                <a:ea typeface="Verdana" pitchFamily="34" charset="0"/>
+                <a:cs typeface="Verdana" pitchFamily="34" charset="0"/>
+              </a:rPr>
+              <a:t>… 0.125</a:t>
+            </a:r>
+            <a:r>
+              <a:rPr lang="en-US" sz="1600" dirty="0">
+                <a:latin typeface="Verdana" pitchFamily="34" charset="0"/>
+                <a:ea typeface="Verdana" pitchFamily="34" charset="0"/>
+                <a:cs typeface="Verdana" pitchFamily="34" charset="0"/>
+              </a:rPr>
+              <a:t>]</a:t>
+            </a:r>
+            <a:br>
+              <a:rPr lang="en-US" sz="1600" dirty="0">
+                <a:latin typeface="Verdana" pitchFamily="34" charset="0"/>
+                <a:ea typeface="Verdana" pitchFamily="34" charset="0"/>
+                <a:cs typeface="Verdana" pitchFamily="34" charset="0"/>
+              </a:rPr>
+            </a:br>
+            <a:r>
+              <a:rPr lang="en-US" sz="1600" dirty="0" err="1">
+                <a:latin typeface="Verdana" pitchFamily="34" charset="0"/>
+                <a:ea typeface="Verdana" pitchFamily="34" charset="0"/>
+                <a:cs typeface="Verdana" pitchFamily="34" charset="0"/>
+              </a:rPr>
+              <a:t>texCoordT</a:t>
+            </a:r>
+            <a:r>
+              <a:rPr lang="en-US" sz="1600" dirty="0">
+                <a:latin typeface="Verdana" pitchFamily="34" charset="0"/>
+                <a:ea typeface="Verdana" pitchFamily="34" charset="0"/>
+                <a:cs typeface="Verdana" pitchFamily="34" charset="0"/>
+              </a:rPr>
+              <a:t> = [</a:t>
+            </a:r>
+            <a:r>
+              <a:rPr lang="en-US" sz="1600" dirty="0">
+                <a:latin typeface="Verdana" pitchFamily="34" charset="0"/>
+                <a:ea typeface="Verdana" pitchFamily="34" charset="0"/>
+                <a:cs typeface="Verdana" pitchFamily="34" charset="0"/>
+              </a:rPr>
+              <a:t>0</a:t>
+            </a:r>
+            <a:r>
+              <a:rPr lang="en-US" sz="1600" dirty="0">
+                <a:latin typeface="Verdana" pitchFamily="34" charset="0"/>
+                <a:ea typeface="Verdana" pitchFamily="34" charset="0"/>
+                <a:cs typeface="Verdana" pitchFamily="34" charset="0"/>
+              </a:rPr>
+              <a:t>, </a:t>
+            </a:r>
+            <a:r>
+              <a:rPr lang="en-US" sz="1600" dirty="0">
+                <a:latin typeface="Verdana" pitchFamily="34" charset="0"/>
+                <a:ea typeface="Verdana" pitchFamily="34" charset="0"/>
+                <a:cs typeface="Verdana" pitchFamily="34" charset="0"/>
+              </a:rPr>
+              <a:t>0</a:t>
+            </a:r>
+            <a:r>
+              <a:rPr lang="en-US" sz="1600" dirty="0">
+                <a:latin typeface="Verdana" pitchFamily="34" charset="0"/>
+                <a:ea typeface="Verdana" pitchFamily="34" charset="0"/>
+                <a:cs typeface="Verdana" pitchFamily="34" charset="0"/>
+              </a:rPr>
+              <a:t>, </a:t>
+            </a:r>
+            <a:r>
+              <a:rPr lang="en-US" sz="1600" dirty="0">
+                <a:latin typeface="Verdana" pitchFamily="34" charset="0"/>
+                <a:ea typeface="Verdana" pitchFamily="34" charset="0"/>
+                <a:cs typeface="Verdana" pitchFamily="34" charset="0"/>
+              </a:rPr>
+              <a:t>0.25</a:t>
+            </a:r>
+            <a:r>
+              <a:rPr lang="en-US" sz="1600" dirty="0">
+                <a:latin typeface="Verdana" pitchFamily="34" charset="0"/>
+                <a:ea typeface="Verdana" pitchFamily="34" charset="0"/>
+                <a:cs typeface="Verdana" pitchFamily="34" charset="0"/>
+              </a:rPr>
+              <a:t>, </a:t>
+            </a:r>
+            <a:r>
+              <a:rPr lang="en-US" sz="1600" dirty="0">
+                <a:latin typeface="Verdana" pitchFamily="34" charset="0"/>
+                <a:ea typeface="Verdana" pitchFamily="34" charset="0"/>
+                <a:cs typeface="Verdana" pitchFamily="34" charset="0"/>
+              </a:rPr>
+              <a:t>0.25</a:t>
+            </a:r>
+            <a:r>
+              <a:rPr lang="en-US" sz="1600" dirty="0">
+                <a:latin typeface="Verdana" pitchFamily="34" charset="0"/>
+                <a:ea typeface="Verdana" pitchFamily="34" charset="0"/>
+                <a:cs typeface="Verdana" pitchFamily="34" charset="0"/>
+              </a:rPr>
+              <a:t>, </a:t>
+            </a:r>
+            <a:r>
+              <a:rPr lang="en-US" sz="1600" dirty="0" smtClean="0">
+                <a:latin typeface="Verdana" pitchFamily="34" charset="0"/>
+                <a:ea typeface="Verdana" pitchFamily="34" charset="0"/>
+                <a:cs typeface="Verdana" pitchFamily="34" charset="0"/>
+              </a:rPr>
+              <a:t>.. 0.25</a:t>
+            </a:r>
+            <a:r>
+              <a:rPr lang="en-US" sz="1600" dirty="0">
+                <a:latin typeface="Verdana" pitchFamily="34" charset="0"/>
+                <a:ea typeface="Verdana" pitchFamily="34" charset="0"/>
+                <a:cs typeface="Verdana" pitchFamily="34" charset="0"/>
+              </a:rPr>
+              <a:t>, </a:t>
+            </a:r>
+            <a:r>
+              <a:rPr lang="en-US" sz="1600" dirty="0">
+                <a:latin typeface="Verdana" pitchFamily="34" charset="0"/>
+                <a:ea typeface="Verdana" pitchFamily="34" charset="0"/>
+                <a:cs typeface="Verdana" pitchFamily="34" charset="0"/>
+              </a:rPr>
+              <a:t>0.25</a:t>
+            </a:r>
+            <a:r>
+              <a:rPr lang="en-US" sz="1600" dirty="0" smtClean="0">
+                <a:latin typeface="Verdana" pitchFamily="34" charset="0"/>
+                <a:ea typeface="Verdana" pitchFamily="34" charset="0"/>
+                <a:cs typeface="Verdana" pitchFamily="34" charset="0"/>
+              </a:rPr>
+              <a:t>]</a:t>
+            </a:r>
+          </a:p>
+          <a:p>
+            <a:r>
+              <a:rPr lang="en-US" sz="1600" dirty="0">
+                <a:latin typeface="Verdana" pitchFamily="34" charset="0"/>
+                <a:ea typeface="Verdana" pitchFamily="34" charset="0"/>
+                <a:cs typeface="Verdana" pitchFamily="34" charset="0"/>
+              </a:rPr>
+              <a:t/>
+            </a:r>
+            <a:br>
+              <a:rPr lang="en-US" sz="1600" dirty="0">
+                <a:latin typeface="Verdana" pitchFamily="34" charset="0"/>
+                <a:ea typeface="Verdana" pitchFamily="34" charset="0"/>
+                <a:cs typeface="Verdana" pitchFamily="34" charset="0"/>
+              </a:rPr>
+            </a:br>
+            <a:r>
+              <a:rPr lang="en-US" sz="1600" dirty="0" err="1">
+                <a:latin typeface="Verdana" pitchFamily="34" charset="0"/>
+                <a:ea typeface="Verdana" pitchFamily="34" charset="0"/>
+                <a:cs typeface="Verdana" pitchFamily="34" charset="0"/>
+              </a:rPr>
+              <a:t>vertexData</a:t>
+            </a:r>
+            <a:r>
+              <a:rPr lang="en-US" sz="1600" dirty="0">
+                <a:latin typeface="Verdana" pitchFamily="34" charset="0"/>
+                <a:ea typeface="Verdana" pitchFamily="34" charset="0"/>
+                <a:cs typeface="Verdana" pitchFamily="34" charset="0"/>
+              </a:rPr>
+              <a:t> = {</a:t>
+            </a:r>
+            <a:r>
+              <a:rPr lang="en-US" sz="1600" dirty="0" err="1">
+                <a:latin typeface="Verdana" pitchFamily="34" charset="0"/>
+                <a:ea typeface="Verdana" pitchFamily="34" charset="0"/>
+                <a:cs typeface="Verdana" pitchFamily="34" charset="0"/>
+              </a:rPr>
+              <a:t>ri.P</a:t>
+            </a:r>
+            <a:r>
+              <a:rPr lang="en-US" sz="1600" dirty="0">
+                <a:latin typeface="Verdana" pitchFamily="34" charset="0"/>
+                <a:ea typeface="Verdana" pitchFamily="34" charset="0"/>
+                <a:cs typeface="Verdana" pitchFamily="34" charset="0"/>
+              </a:rPr>
+              <a:t>: position, </a:t>
+            </a:r>
+            <a:r>
+              <a:rPr lang="en-US" sz="1600" dirty="0">
+                <a:latin typeface="Verdana" pitchFamily="34" charset="0"/>
+                <a:ea typeface="Verdana" pitchFamily="34" charset="0"/>
+                <a:cs typeface="Verdana" pitchFamily="34" charset="0"/>
+              </a:rPr>
+              <a:t>"</a:t>
+            </a:r>
+            <a:r>
+              <a:rPr lang="en-US" sz="1600" dirty="0" err="1">
+                <a:latin typeface="Verdana" pitchFamily="34" charset="0"/>
+                <a:ea typeface="Verdana" pitchFamily="34" charset="0"/>
+                <a:cs typeface="Verdana" pitchFamily="34" charset="0"/>
+              </a:rPr>
+              <a:t>facevarying</a:t>
+            </a:r>
+            <a:r>
+              <a:rPr lang="en-US" sz="1600" dirty="0">
+                <a:latin typeface="Verdana" pitchFamily="34" charset="0"/>
+                <a:ea typeface="Verdana" pitchFamily="34" charset="0"/>
+                <a:cs typeface="Verdana" pitchFamily="34" charset="0"/>
+              </a:rPr>
+              <a:t> normal N"</a:t>
+            </a:r>
+            <a:r>
+              <a:rPr lang="en-US" sz="1600" dirty="0">
+                <a:latin typeface="Verdana" pitchFamily="34" charset="0"/>
+                <a:ea typeface="Verdana" pitchFamily="34" charset="0"/>
+                <a:cs typeface="Verdana" pitchFamily="34" charset="0"/>
+              </a:rPr>
+              <a:t>: normal, </a:t>
+            </a:r>
+            <a:r>
+              <a:rPr lang="en-US" sz="1600" dirty="0">
+                <a:latin typeface="Verdana" pitchFamily="34" charset="0"/>
+                <a:ea typeface="Verdana" pitchFamily="34" charset="0"/>
+                <a:cs typeface="Verdana" pitchFamily="34" charset="0"/>
+              </a:rPr>
+              <a:t>"</a:t>
+            </a:r>
+            <a:r>
+              <a:rPr lang="en-US" sz="1600" dirty="0" err="1">
+                <a:latin typeface="Verdana" pitchFamily="34" charset="0"/>
+                <a:ea typeface="Verdana" pitchFamily="34" charset="0"/>
+                <a:cs typeface="Verdana" pitchFamily="34" charset="0"/>
+              </a:rPr>
+              <a:t>facevarying</a:t>
+            </a:r>
+            <a:r>
+              <a:rPr lang="en-US" sz="1600" dirty="0">
+                <a:latin typeface="Verdana" pitchFamily="34" charset="0"/>
+                <a:ea typeface="Verdana" pitchFamily="34" charset="0"/>
+                <a:cs typeface="Verdana" pitchFamily="34" charset="0"/>
+              </a:rPr>
+              <a:t> float s"</a:t>
+            </a:r>
+            <a:r>
+              <a:rPr lang="en-US" sz="1600" dirty="0">
+                <a:latin typeface="Verdana" pitchFamily="34" charset="0"/>
+                <a:ea typeface="Verdana" pitchFamily="34" charset="0"/>
+                <a:cs typeface="Verdana" pitchFamily="34" charset="0"/>
+              </a:rPr>
+              <a:t>: </a:t>
+            </a:r>
+            <a:r>
+              <a:rPr lang="en-US" sz="1600" dirty="0" err="1">
+                <a:latin typeface="Verdana" pitchFamily="34" charset="0"/>
+                <a:ea typeface="Verdana" pitchFamily="34" charset="0"/>
+                <a:cs typeface="Verdana" pitchFamily="34" charset="0"/>
+              </a:rPr>
+              <a:t>texCoordS</a:t>
+            </a:r>
+            <a:r>
+              <a:rPr lang="en-US" sz="1600" dirty="0">
+                <a:latin typeface="Verdana" pitchFamily="34" charset="0"/>
+                <a:ea typeface="Verdana" pitchFamily="34" charset="0"/>
+                <a:cs typeface="Verdana" pitchFamily="34" charset="0"/>
+              </a:rPr>
+              <a:t>, </a:t>
+            </a:r>
+            <a:r>
+              <a:rPr lang="en-US" sz="1600" dirty="0">
+                <a:latin typeface="Verdana" pitchFamily="34" charset="0"/>
+                <a:ea typeface="Verdana" pitchFamily="34" charset="0"/>
+                <a:cs typeface="Verdana" pitchFamily="34" charset="0"/>
+              </a:rPr>
+              <a:t>"</a:t>
+            </a:r>
+            <a:r>
+              <a:rPr lang="en-US" sz="1600" dirty="0" err="1">
+                <a:latin typeface="Verdana" pitchFamily="34" charset="0"/>
+                <a:ea typeface="Verdana" pitchFamily="34" charset="0"/>
+                <a:cs typeface="Verdana" pitchFamily="34" charset="0"/>
+              </a:rPr>
+              <a:t>facevarying</a:t>
+            </a:r>
+            <a:r>
+              <a:rPr lang="en-US" sz="1600" dirty="0">
+                <a:latin typeface="Verdana" pitchFamily="34" charset="0"/>
+                <a:ea typeface="Verdana" pitchFamily="34" charset="0"/>
+                <a:cs typeface="Verdana" pitchFamily="34" charset="0"/>
+              </a:rPr>
+              <a:t> float t"</a:t>
+            </a:r>
+            <a:r>
+              <a:rPr lang="en-US" sz="1600" dirty="0">
+                <a:latin typeface="Verdana" pitchFamily="34" charset="0"/>
+                <a:ea typeface="Verdana" pitchFamily="34" charset="0"/>
+                <a:cs typeface="Verdana" pitchFamily="34" charset="0"/>
+              </a:rPr>
+              <a:t>: </a:t>
+            </a:r>
+            <a:r>
+              <a:rPr lang="en-US" sz="1600" dirty="0" err="1">
+                <a:latin typeface="Verdana" pitchFamily="34" charset="0"/>
+                <a:ea typeface="Verdana" pitchFamily="34" charset="0"/>
+                <a:cs typeface="Verdana" pitchFamily="34" charset="0"/>
+              </a:rPr>
+              <a:t>texCoordT</a:t>
+            </a:r>
+            <a:r>
+              <a:rPr lang="en-US" sz="1600" dirty="0" smtClean="0">
+                <a:latin typeface="Verdana" pitchFamily="34" charset="0"/>
+                <a:ea typeface="Verdana" pitchFamily="34" charset="0"/>
+                <a:cs typeface="Verdana" pitchFamily="34" charset="0"/>
+              </a:rPr>
+              <a:t>}</a:t>
+            </a:r>
+            <a:r>
+              <a:rPr lang="en-US" sz="1600" dirty="0">
+                <a:latin typeface="Verdana" pitchFamily="34" charset="0"/>
+                <a:ea typeface="Verdana" pitchFamily="34" charset="0"/>
+                <a:cs typeface="Verdana" pitchFamily="34" charset="0"/>
+              </a:rPr>
+              <a:t/>
+            </a:r>
+            <a:br>
+              <a:rPr lang="en-US" sz="1600" dirty="0">
+                <a:latin typeface="Verdana" pitchFamily="34" charset="0"/>
+                <a:ea typeface="Verdana" pitchFamily="34" charset="0"/>
+                <a:cs typeface="Verdana" pitchFamily="34" charset="0"/>
+              </a:rPr>
+            </a:br>
+            <a:endParaRPr lang="en-US" sz="1600" dirty="0" smtClean="0">
+              <a:latin typeface="Verdana" pitchFamily="34" charset="0"/>
+              <a:ea typeface="Verdana" pitchFamily="34" charset="0"/>
+              <a:cs typeface="Verdana" pitchFamily="34" charset="0"/>
+            </a:endParaRPr>
+          </a:p>
+          <a:p>
+            <a:r>
+              <a:rPr lang="en-US" sz="1600" dirty="0" err="1" smtClean="0">
+                <a:latin typeface="Verdana" pitchFamily="34" charset="0"/>
+                <a:ea typeface="Verdana" pitchFamily="34" charset="0"/>
+                <a:cs typeface="Verdana" pitchFamily="34" charset="0"/>
+              </a:rPr>
+              <a:t>ri.PointsPolygons</a:t>
+            </a:r>
+            <a:r>
+              <a:rPr lang="en-US" sz="1600" dirty="0" smtClean="0">
+                <a:latin typeface="Verdana" pitchFamily="34" charset="0"/>
+                <a:ea typeface="Verdana" pitchFamily="34" charset="0"/>
+                <a:cs typeface="Verdana" pitchFamily="34" charset="0"/>
+              </a:rPr>
+              <a:t>(</a:t>
+            </a:r>
+            <a:r>
+              <a:rPr lang="en-US" sz="1600" dirty="0" err="1" smtClean="0">
+                <a:latin typeface="Verdana" pitchFamily="34" charset="0"/>
+                <a:ea typeface="Verdana" pitchFamily="34" charset="0"/>
+                <a:cs typeface="Verdana" pitchFamily="34" charset="0"/>
+              </a:rPr>
+              <a:t>nverts,indices,vertexData</a:t>
+            </a:r>
+            <a:r>
+              <a:rPr lang="en-US" sz="1600" dirty="0">
+                <a:latin typeface="Verdana" pitchFamily="34" charset="0"/>
+                <a:ea typeface="Verdana" pitchFamily="34" charset="0"/>
+                <a:cs typeface="Verdana" pitchFamily="34" charset="0"/>
+              </a:rPr>
+              <a:t>)</a:t>
+            </a:r>
+            <a:endParaRPr lang="en-US" sz="1600" dirty="0">
+              <a:latin typeface="Verdana" pitchFamily="34" charset="0"/>
+              <a:ea typeface="Verdana" pitchFamily="34" charset="0"/>
+              <a:cs typeface="Verdana" pitchFamily="34" charset="0"/>
+            </a:endParaRPr>
+          </a:p>
+        </p:txBody>
+      </p:sp>
+    </p:spTree>
+    <p:extLst>
+      <p:ext uri="{BB962C8B-B14F-4D97-AF65-F5344CB8AC3E}">
+        <p14:creationId xmlns:p14="http://schemas.microsoft.com/office/powerpoint/2010/main" val="3504008160"/>
+      </p:ext>
+    </p:extLst>
+  </p:cSld>
+  <p:clrMapOvr>
+    <a:masterClrMapping/>
+  </p:clrMapOvr>
+  <p:timing>
+    <p:tnLst>
+      <p:par>
+        <p:cTn id="1" dur="indefinite" restart="never" nodeType="tmRoot"/>
+      </p:par>
+    </p:tnLst>
+  </p:timing>
+</p:sld>
+</file>
+
+<file path=ppt/slides/slide18.xml><?xml version="1.0" encoding="utf-8"?>
+<p:sld xmlns:a="http://schemas.openxmlformats.org/drawingml/2006/main" xmlns:r="http://schemas.openxmlformats.org/officeDocument/2006/relationships" xmlns:p="http://schemas.openxmlformats.org/presentationml/2006/main">
+  <p:cSld>
+    <p:spTree>
+      <p:nvGrpSpPr>
+        <p:cNvPr id="1" name=""/>
+        <p:cNvGrpSpPr/>
+        <p:nvPr/>
+      </p:nvGrpSpPr>
+      <p:grpSpPr>
+        <a:xfrm>
+          <a:off x="0" y="0"/>
+          <a:ext cx="0" cy="0"/>
+          <a:chOff x="0" y="0"/>
+          <a:chExt cx="0" cy="0"/>
+        </a:xfrm>
+      </p:grpSpPr>
+      <p:sp>
+        <p:nvSpPr>
+          <p:cNvPr id="2" name="Title 1"/>
+          <p:cNvSpPr>
+            <a:spLocks noGrp="1"/>
+          </p:cNvSpPr>
+          <p:nvPr>
+            <p:ph type="ctrTitle"/>
+          </p:nvPr>
+        </p:nvSpPr>
+        <p:spPr>
+          <a:xfrm>
+            <a:off x="1909727" y="35560"/>
+            <a:ext cx="7772400" cy="1470025"/>
+          </a:xfrm>
+        </p:spPr>
+        <p:txBody>
+          <a:bodyPr/>
+          <a:lstStyle/>
+          <a:p>
+            <a:r>
+              <a:rPr lang="en-US" dirty="0" smtClean="0"/>
+              <a:t>Other </a:t>
+            </a:r>
+            <a:r>
+              <a:rPr lang="en-US" dirty="0" smtClean="0"/>
+              <a:t>Geometry</a:t>
+            </a:r>
+            <a:endParaRPr lang="en-US" dirty="0"/>
+          </a:p>
+        </p:txBody>
+      </p:sp>
+      <p:sp>
+        <p:nvSpPr>
+          <p:cNvPr id="3" name="Rectangle 2"/>
+          <p:cNvSpPr/>
+          <p:nvPr/>
+        </p:nvSpPr>
+        <p:spPr>
+          <a:xfrm>
+            <a:off x="533400" y="2693521"/>
+            <a:ext cx="8010525" cy="1938992"/>
+          </a:xfrm>
+          <a:prstGeom prst="rect">
+            <a:avLst/>
+          </a:prstGeom>
+        </p:spPr>
+        <p:txBody>
+          <a:bodyPr wrap="square">
+            <a:spAutoFit/>
+          </a:bodyPr>
+          <a:lstStyle/>
+          <a:p>
+            <a:r>
+              <a:rPr lang="en-US" sz="2400" i="1" dirty="0" err="1"/>
+              <a:t>PatchMesh</a:t>
+            </a:r>
+            <a:r>
+              <a:rPr lang="en-US" sz="2400" i="1" dirty="0"/>
+              <a:t> </a:t>
+            </a:r>
+            <a:r>
+              <a:rPr lang="en-US" sz="2400" dirty="0" smtClean="0">
+                <a:ea typeface="Verdana" pitchFamily="34" charset="0"/>
+                <a:cs typeface="Verdana" pitchFamily="34" charset="0"/>
+              </a:rPr>
+              <a:t>– Mesh made of quad patches</a:t>
+            </a:r>
+          </a:p>
+          <a:p>
+            <a:r>
+              <a:rPr lang="en-US" sz="2400" i="1" dirty="0" err="1" smtClean="0"/>
+              <a:t>SubdivisionMesh</a:t>
+            </a:r>
+            <a:r>
+              <a:rPr lang="en-US" sz="2400" i="1" dirty="0" smtClean="0"/>
+              <a:t> – </a:t>
+            </a:r>
+            <a:r>
+              <a:rPr lang="en-US" sz="2400" dirty="0" smtClean="0"/>
+              <a:t>Mesh subdivided from smaller control mesh</a:t>
+            </a:r>
+          </a:p>
+          <a:p>
+            <a:r>
+              <a:rPr lang="en-US" sz="2400" i="1" dirty="0" smtClean="0"/>
+              <a:t>Blobby </a:t>
+            </a:r>
+            <a:r>
+              <a:rPr lang="en-US" sz="2400" dirty="0" smtClean="0"/>
+              <a:t>– Object represented as signed distance field</a:t>
+            </a:r>
+          </a:p>
+          <a:p>
+            <a:r>
+              <a:rPr lang="en-US" sz="2400" i="1" dirty="0" smtClean="0"/>
+              <a:t>Procedural – </a:t>
+            </a:r>
+            <a:r>
+              <a:rPr lang="en-US" sz="2400" dirty="0" smtClean="0"/>
+              <a:t>User defined in C function</a:t>
+            </a:r>
+          </a:p>
+          <a:p>
+            <a:endParaRPr lang="en-US" sz="2400" i="1" dirty="0">
+              <a:ea typeface="Verdana" pitchFamily="34" charset="0"/>
+              <a:cs typeface="Verdana" pitchFamily="34" charset="0"/>
+            </a:endParaRPr>
+          </a:p>
+        </p:txBody>
+      </p:sp>
+    </p:spTree>
+    <p:extLst>
+      <p:ext uri="{BB962C8B-B14F-4D97-AF65-F5344CB8AC3E}">
+        <p14:creationId xmlns:p14="http://schemas.microsoft.com/office/powerpoint/2010/main" val="1659765635"/>
+      </p:ext>
+    </p:extLst>
+  </p:cSld>
+  <p:clrMapOvr>
+    <a:masterClrMapping/>
+  </p:clrMapOvr>
+  <p:timing>
+    <p:tnLst>
+      <p:par>
+        <p:cTn id="1" dur="indefinite" restart="never" nodeType="tmRoot"/>
+      </p:par>
+    </p:tnLst>
+  </p:timing>
+</p:sld>
+</file>
+
+<file path=ppt/slides/slide19.xml><?xml version="1.0" encoding="utf-8"?>
+<p:sld xmlns:a="http://schemas.openxmlformats.org/drawingml/2006/main" xmlns:r="http://schemas.openxmlformats.org/officeDocument/2006/relationships" xmlns:p="http://schemas.openxmlformats.org/presentationml/2006/main">
+  <p:cSld>
+    <p:spTree>
+      <p:nvGrpSpPr>
+        <p:cNvPr id="1" name=""/>
+        <p:cNvGrpSpPr/>
+        <p:nvPr/>
+      </p:nvGrpSpPr>
+      <p:grpSpPr>
+        <a:xfrm>
+          <a:off x="0" y="0"/>
+          <a:ext cx="0" cy="0"/>
+          <a:chOff x="0" y="0"/>
+          <a:chExt cx="0" cy="0"/>
+        </a:xfrm>
+      </p:grpSpPr>
+      <p:sp>
+        <p:nvSpPr>
+          <p:cNvPr id="2" name="Title 1"/>
+          <p:cNvSpPr>
+            <a:spLocks noGrp="1"/>
+          </p:cNvSpPr>
+          <p:nvPr>
+            <p:ph type="ctrTitle"/>
+          </p:nvPr>
+        </p:nvSpPr>
+        <p:spPr>
+          <a:xfrm>
+            <a:off x="1909727" y="35560"/>
+            <a:ext cx="7772400" cy="1470025"/>
+          </a:xfrm>
+        </p:spPr>
+        <p:txBody>
+          <a:bodyPr/>
+          <a:lstStyle/>
+          <a:p>
+            <a:r>
+              <a:rPr lang="en-US" dirty="0" smtClean="0"/>
+              <a:t>Shading</a:t>
+            </a:r>
+            <a:endParaRPr lang="en-US" dirty="0"/>
+          </a:p>
+        </p:txBody>
+      </p:sp>
+      <p:sp>
+        <p:nvSpPr>
+          <p:cNvPr id="4" name="Rectangle 3"/>
+          <p:cNvSpPr/>
+          <p:nvPr/>
+        </p:nvSpPr>
+        <p:spPr>
+          <a:xfrm>
+            <a:off x="1447800" y="1752598"/>
+            <a:ext cx="6705600" cy="3416320"/>
+          </a:xfrm>
+          <a:prstGeom prst="rect">
+            <a:avLst/>
+          </a:prstGeom>
+        </p:spPr>
+        <p:txBody>
+          <a:bodyPr wrap="square">
+            <a:spAutoFit/>
+          </a:bodyPr>
+          <a:lstStyle/>
+          <a:p>
+            <a:pPr marL="285750" indent="-285750">
+              <a:buFont typeface="Arial" pitchFamily="34" charset="0"/>
+              <a:buChar char="•"/>
+            </a:pPr>
+            <a:r>
+              <a:rPr lang="en-US" sz="2400" dirty="0" smtClean="0"/>
+              <a:t>In recent versions </a:t>
+            </a:r>
+            <a:r>
+              <a:rPr lang="en-US" sz="2400" dirty="0" err="1" smtClean="0"/>
+              <a:t>RenderMan</a:t>
+            </a:r>
+            <a:r>
+              <a:rPr lang="en-US" sz="2400" dirty="0" smtClean="0"/>
+              <a:t> moved to a path tracing approach: RIS</a:t>
+            </a:r>
+          </a:p>
+          <a:p>
+            <a:pPr marL="285750" indent="-285750">
+              <a:buFont typeface="Arial" pitchFamily="34" charset="0"/>
+              <a:buChar char="•"/>
+            </a:pPr>
+            <a:r>
+              <a:rPr lang="en-US" sz="2400" dirty="0" smtClean="0"/>
+              <a:t>Physically correct</a:t>
+            </a:r>
+          </a:p>
+          <a:p>
+            <a:pPr marL="285750" indent="-285750">
+              <a:buFont typeface="Arial" pitchFamily="34" charset="0"/>
+              <a:buChar char="•"/>
+            </a:pPr>
+            <a:r>
+              <a:rPr lang="en-US" sz="2400" dirty="0" smtClean="0"/>
+              <a:t>Ray traced</a:t>
+            </a:r>
+          </a:p>
+          <a:p>
+            <a:pPr marL="285750" indent="-285750">
+              <a:buFont typeface="Arial" pitchFamily="34" charset="0"/>
+              <a:buChar char="•"/>
+            </a:pPr>
+            <a:r>
+              <a:rPr lang="en-US" sz="2400" dirty="0" smtClean="0"/>
+              <a:t>All the shading implemented via the BXDF function</a:t>
+            </a:r>
+          </a:p>
+          <a:p>
+            <a:pPr marL="285750" indent="-285750">
+              <a:buFont typeface="Arial" pitchFamily="34" charset="0"/>
+              <a:buChar char="•"/>
+            </a:pPr>
+            <a:endParaRPr lang="en-US" sz="2400" dirty="0" smtClean="0"/>
+          </a:p>
+          <a:p>
+            <a:pPr marL="285750" indent="-285750">
+              <a:buFont typeface="Arial" pitchFamily="34" charset="0"/>
+              <a:buChar char="•"/>
+            </a:pPr>
+            <a:endParaRPr lang="en-US" sz="2400" dirty="0" smtClean="0"/>
+          </a:p>
+          <a:p>
+            <a:pPr marL="285750" indent="-285750">
+              <a:buFont typeface="Arial" pitchFamily="34" charset="0"/>
+              <a:buChar char="•"/>
+            </a:pPr>
+            <a:endParaRPr lang="en-US" sz="2400" dirty="0"/>
+          </a:p>
+        </p:txBody>
+      </p:sp>
+    </p:spTree>
+    <p:extLst>
+      <p:ext uri="{BB962C8B-B14F-4D97-AF65-F5344CB8AC3E}">
+        <p14:creationId xmlns:p14="http://schemas.microsoft.com/office/powerpoint/2010/main" val="4017026763"/>
+      </p:ext>
+    </p:extLst>
+  </p:cSld>
+  <p:clrMapOvr>
+    <a:masterClrMapping/>
+  </p:clrMapOvr>
+  <p:timing>
+    <p:tnLst>
+      <p:par>
+        <p:cTn id="1" dur="indefinite" restart="never" nodeType="tmRoot"/>
+      </p:par>
+    </p:tnLst>
+  </p:timing>
+</p:sld>
+</file>
+
+<file path=ppt/slides/slide2.xml><?xml version="1.0" encoding="utf-8"?>
+<p:sld xmlns:a="http://schemas.openxmlformats.org/drawingml/2006/main" xmlns:r="http://schemas.openxmlformats.org/officeDocument/2006/relationships" xmlns:p="http://schemas.openxmlformats.org/presentationml/2006/main">
+  <p:cSld>
+    <p:spTree>
+      <p:nvGrpSpPr>
+        <p:cNvPr id="1" name=""/>
+        <p:cNvGrpSpPr/>
+        <p:nvPr/>
+      </p:nvGrpSpPr>
+      <p:grpSpPr>
+        <a:xfrm>
+          <a:off x="0" y="0"/>
+          <a:ext cx="0" cy="0"/>
+          <a:chOff x="0" y="0"/>
+          <a:chExt cx="0" cy="0"/>
+        </a:xfrm>
+      </p:grpSpPr>
+      <p:sp>
+        <p:nvSpPr>
+          <p:cNvPr id="2" name="Title 1"/>
+          <p:cNvSpPr>
+            <a:spLocks noGrp="1"/>
+          </p:cNvSpPr>
+          <p:nvPr>
+            <p:ph type="ctrTitle"/>
+          </p:nvPr>
+        </p:nvSpPr>
+        <p:spPr>
+          <a:xfrm>
+            <a:off x="1909727" y="35560"/>
+            <a:ext cx="7772400" cy="1470025"/>
+          </a:xfrm>
+        </p:spPr>
+        <p:txBody>
+          <a:bodyPr/>
+          <a:lstStyle/>
+          <a:p>
+            <a:r>
+              <a:rPr lang="en-US" dirty="0" smtClean="0"/>
+              <a:t>Prerequisites</a:t>
+            </a:r>
+            <a:endParaRPr lang="en-US" dirty="0"/>
+          </a:p>
+        </p:txBody>
+      </p:sp>
+      <p:sp>
+        <p:nvSpPr>
+          <p:cNvPr id="3" name="Rectangle 2"/>
+          <p:cNvSpPr/>
+          <p:nvPr/>
+        </p:nvSpPr>
+        <p:spPr>
+          <a:xfrm>
+            <a:off x="762000" y="2057400"/>
+            <a:ext cx="8382000" cy="3416320"/>
+          </a:xfrm>
+          <a:prstGeom prst="rect">
+            <a:avLst/>
+          </a:prstGeom>
+        </p:spPr>
+        <p:txBody>
+          <a:bodyPr wrap="square">
+            <a:spAutoFit/>
+          </a:bodyPr>
+          <a:lstStyle/>
+          <a:p>
+            <a:pPr marL="285750" indent="-285750">
+              <a:buFont typeface="Arial" pitchFamily="34" charset="0"/>
+              <a:buChar char="•"/>
+            </a:pPr>
+            <a:r>
+              <a:rPr lang="en-US" sz="2400" dirty="0" smtClean="0"/>
+              <a:t>Go to: </a:t>
+            </a:r>
+            <a:r>
+              <a:rPr lang="en-US" sz="2400" dirty="0" smtClean="0">
+                <a:hlinkClick r:id="rId2"/>
+              </a:rPr>
+              <a:t>https://renderman.pixar.com/view/get-renderman</a:t>
+            </a:r>
+            <a:endParaRPr lang="en-US" sz="2400" dirty="0" smtClean="0"/>
+          </a:p>
+          <a:p>
+            <a:pPr marL="285750" indent="-285750">
+              <a:buFont typeface="Arial" pitchFamily="34" charset="0"/>
+              <a:buChar char="•"/>
+            </a:pPr>
+            <a:r>
+              <a:rPr lang="en-US" sz="2400" dirty="0" smtClean="0"/>
+              <a:t>Click next and select </a:t>
+            </a:r>
+            <a:r>
+              <a:rPr lang="en-US" sz="2400" i="1" dirty="0" smtClean="0"/>
+              <a:t>Create a </a:t>
+            </a:r>
+            <a:r>
+              <a:rPr lang="en-US" sz="2400" i="1" dirty="0" err="1" smtClean="0"/>
+              <a:t>RenderMan</a:t>
+            </a:r>
+            <a:r>
+              <a:rPr lang="en-US" sz="2400" i="1" dirty="0" smtClean="0"/>
+              <a:t> Forums Account</a:t>
+            </a:r>
+            <a:r>
+              <a:rPr lang="en-US" sz="2400" dirty="0" smtClean="0"/>
+              <a:t> create an account</a:t>
+            </a:r>
+          </a:p>
+          <a:p>
+            <a:pPr marL="285750" indent="-285750">
+              <a:buFont typeface="Arial" pitchFamily="34" charset="0"/>
+              <a:buChar char="•"/>
+            </a:pPr>
+            <a:r>
+              <a:rPr lang="en-US" sz="2400" dirty="0" smtClean="0"/>
+              <a:t>Agree to terms and fill in registration form </a:t>
+            </a:r>
+          </a:p>
+          <a:p>
+            <a:pPr marL="285750" indent="-285750">
+              <a:buFont typeface="Arial" pitchFamily="34" charset="0"/>
+              <a:buChar char="•"/>
+            </a:pPr>
+            <a:r>
+              <a:rPr lang="en-US" sz="2400" dirty="0" smtClean="0"/>
+              <a:t>Click on link in email</a:t>
+            </a:r>
+          </a:p>
+          <a:p>
+            <a:pPr marL="285750" indent="-285750">
+              <a:buFont typeface="Arial" pitchFamily="34" charset="0"/>
+              <a:buChar char="•"/>
+            </a:pPr>
+            <a:r>
+              <a:rPr lang="en-US" sz="2400" dirty="0" smtClean="0"/>
+              <a:t>Go back to the </a:t>
+            </a:r>
+            <a:r>
+              <a:rPr lang="en-US" sz="2400" i="1" dirty="0" smtClean="0"/>
+              <a:t>Get </a:t>
+            </a:r>
+            <a:r>
+              <a:rPr lang="en-US" sz="2400" i="1" dirty="0" err="1" smtClean="0"/>
+              <a:t>RenderMan</a:t>
+            </a:r>
+            <a:r>
+              <a:rPr lang="en-US" sz="2400" i="1" dirty="0" smtClean="0"/>
+              <a:t> </a:t>
+            </a:r>
+            <a:r>
+              <a:rPr lang="en-US" sz="2400" dirty="0" smtClean="0"/>
+              <a:t>page after logging in</a:t>
+            </a:r>
+          </a:p>
+          <a:p>
+            <a:pPr marL="285750" indent="-285750">
+              <a:buFont typeface="Arial" pitchFamily="34" charset="0"/>
+              <a:buChar char="•"/>
+            </a:pPr>
+            <a:r>
+              <a:rPr lang="en-US" sz="2400" dirty="0" smtClean="0"/>
+              <a:t>Fill in form and go to download link (</a:t>
+            </a:r>
+            <a:r>
+              <a:rPr lang="en-US" sz="2400" dirty="0" err="1" smtClean="0"/>
+              <a:t>RenderMan</a:t>
+            </a:r>
+            <a:r>
+              <a:rPr lang="en-US" sz="2400" dirty="0" smtClean="0"/>
+              <a:t> Server is the component we are interested in)</a:t>
+            </a:r>
+          </a:p>
+          <a:p>
+            <a:pPr marL="285750" indent="-285750">
+              <a:buFont typeface="Arial" pitchFamily="34" charset="0"/>
+              <a:buChar char="•"/>
+            </a:pPr>
+            <a:endParaRPr lang="en-US" sz="2400" dirty="0"/>
+          </a:p>
+        </p:txBody>
+      </p:sp>
+    </p:spTree>
+    <p:extLst>
+      <p:ext uri="{BB962C8B-B14F-4D97-AF65-F5344CB8AC3E}">
+        <p14:creationId xmlns:p14="http://schemas.microsoft.com/office/powerpoint/2010/main" val="3011564685"/>
+      </p:ext>
+    </p:extLst>
+  </p:cSld>
+  <p:clrMapOvr>
+    <a:masterClrMapping/>
+  </p:clrMapOvr>
+  <p:timing>
+    <p:tnLst>
+      <p:par>
+        <p:cTn id="1" dur="indefinite" restart="never" nodeType="tmRoot"/>
+      </p:par>
+    </p:tnLst>
+  </p:timing>
+</p:sld>
+</file>
+
+<file path=ppt/slides/slide20.xml><?xml version="1.0" encoding="utf-8"?>
+<p:sld xmlns:a="http://schemas.openxmlformats.org/drawingml/2006/main" xmlns:r="http://schemas.openxmlformats.org/officeDocument/2006/relationships" xmlns:p="http://schemas.openxmlformats.org/presentationml/2006/main">
+  <p:cSld>
+    <p:spTree>
+      <p:nvGrpSpPr>
+        <p:cNvPr id="1" name=""/>
+        <p:cNvGrpSpPr/>
+        <p:nvPr/>
+      </p:nvGrpSpPr>
+      <p:grpSpPr>
+        <a:xfrm>
+          <a:off x="0" y="0"/>
+          <a:ext cx="0" cy="0"/>
+          <a:chOff x="0" y="0"/>
+          <a:chExt cx="0" cy="0"/>
+        </a:xfrm>
+      </p:grpSpPr>
+      <p:sp>
+        <p:nvSpPr>
+          <p:cNvPr id="2" name="Title 1"/>
+          <p:cNvSpPr>
+            <a:spLocks noGrp="1"/>
+          </p:cNvSpPr>
+          <p:nvPr>
+            <p:ph type="ctrTitle"/>
+          </p:nvPr>
+        </p:nvSpPr>
+        <p:spPr>
+          <a:xfrm>
+            <a:off x="1909727" y="35560"/>
+            <a:ext cx="7772400" cy="1470025"/>
+          </a:xfrm>
+        </p:spPr>
+        <p:txBody>
+          <a:bodyPr/>
+          <a:lstStyle/>
+          <a:p>
+            <a:r>
+              <a:rPr lang="en-US" dirty="0" smtClean="0"/>
+              <a:t>Lights</a:t>
+            </a:r>
+            <a:endParaRPr lang="en-US" dirty="0"/>
+          </a:p>
+        </p:txBody>
+      </p:sp>
+      <p:sp>
+        <p:nvSpPr>
+          <p:cNvPr id="4" name="Rectangle 3"/>
+          <p:cNvSpPr/>
+          <p:nvPr/>
+        </p:nvSpPr>
+        <p:spPr>
+          <a:xfrm>
+            <a:off x="1447800" y="1752598"/>
+            <a:ext cx="6705600" cy="1200329"/>
+          </a:xfrm>
+          <a:prstGeom prst="rect">
+            <a:avLst/>
+          </a:prstGeom>
+        </p:spPr>
+        <p:txBody>
+          <a:bodyPr wrap="square">
+            <a:spAutoFit/>
+          </a:bodyPr>
+          <a:lstStyle/>
+          <a:p>
+            <a:pPr marL="285750" indent="-285750">
+              <a:buFont typeface="Arial" pitchFamily="34" charset="0"/>
+              <a:buChar char="•"/>
+            </a:pPr>
+            <a:endParaRPr lang="en-US" sz="2400" dirty="0" smtClean="0"/>
+          </a:p>
+          <a:p>
+            <a:pPr marL="285750" indent="-285750">
+              <a:buFont typeface="Arial" pitchFamily="34" charset="0"/>
+              <a:buChar char="•"/>
+            </a:pPr>
+            <a:endParaRPr lang="en-US" sz="2400" dirty="0" smtClean="0"/>
+          </a:p>
+          <a:p>
+            <a:pPr marL="285750" indent="-285750">
+              <a:buFont typeface="Arial" pitchFamily="34" charset="0"/>
+              <a:buChar char="•"/>
+            </a:pPr>
+            <a:endParaRPr lang="en-US" sz="2400" dirty="0"/>
+          </a:p>
+        </p:txBody>
+      </p:sp>
+      <p:sp>
+        <p:nvSpPr>
+          <p:cNvPr id="5" name="Rectangle 4"/>
+          <p:cNvSpPr/>
+          <p:nvPr/>
+        </p:nvSpPr>
+        <p:spPr>
+          <a:xfrm>
+            <a:off x="1447800" y="1752598"/>
+            <a:ext cx="6705600" cy="4154984"/>
+          </a:xfrm>
+          <a:prstGeom prst="rect">
+            <a:avLst/>
+          </a:prstGeom>
+        </p:spPr>
+        <p:txBody>
+          <a:bodyPr wrap="square">
+            <a:spAutoFit/>
+          </a:bodyPr>
+          <a:lstStyle/>
+          <a:p>
+            <a:pPr marL="285750" indent="-285750">
+              <a:buFont typeface="Arial" pitchFamily="34" charset="0"/>
+              <a:buChar char="•"/>
+            </a:pPr>
+            <a:r>
+              <a:rPr lang="en-US" sz="2400" dirty="0"/>
+              <a:t>L</a:t>
+            </a:r>
+            <a:r>
+              <a:rPr lang="en-US" sz="2400" dirty="0" smtClean="0"/>
+              <a:t>ights implemented via </a:t>
+            </a:r>
+            <a:r>
+              <a:rPr lang="en-US" sz="2400" dirty="0" err="1" smtClean="0"/>
+              <a:t>AreaLightSource</a:t>
+            </a:r>
+            <a:endParaRPr lang="en-US" sz="2400" dirty="0" smtClean="0"/>
+          </a:p>
+          <a:p>
+            <a:pPr marL="285750" indent="-285750">
+              <a:buFont typeface="Arial" pitchFamily="34" charset="0"/>
+              <a:buChar char="•"/>
+            </a:pPr>
+            <a:r>
+              <a:rPr lang="en-US" sz="2400" dirty="0" err="1" smtClean="0"/>
+              <a:t>PxrAreaLight</a:t>
+            </a:r>
+            <a:r>
+              <a:rPr lang="en-US" sz="2400" dirty="0" smtClean="0"/>
+              <a:t> is most useful</a:t>
+            </a:r>
+          </a:p>
+          <a:p>
+            <a:pPr marL="285750" indent="-285750">
+              <a:buFont typeface="Arial" pitchFamily="34" charset="0"/>
+              <a:buChar char="•"/>
+            </a:pPr>
+            <a:r>
+              <a:rPr lang="en-US" sz="2400" dirty="0" smtClean="0"/>
+              <a:t>Shape parameter defines types </a:t>
+            </a:r>
+          </a:p>
+          <a:p>
+            <a:pPr marL="800100" lvl="1" indent="-342900">
+              <a:buFont typeface="Arial" pitchFamily="34" charset="0"/>
+              <a:buChar char="•"/>
+            </a:pPr>
+            <a:r>
+              <a:rPr lang="en-US" sz="2400" dirty="0" err="1" smtClean="0"/>
+              <a:t>rect</a:t>
+            </a:r>
+            <a:endParaRPr lang="en-US" sz="2400" dirty="0"/>
+          </a:p>
+          <a:p>
+            <a:pPr marL="800100" lvl="1" indent="-342900">
+              <a:buFont typeface="Arial" pitchFamily="34" charset="0"/>
+              <a:buChar char="•"/>
+            </a:pPr>
+            <a:r>
+              <a:rPr lang="en-US" sz="2400" dirty="0" smtClean="0"/>
+              <a:t>disk</a:t>
+            </a:r>
+            <a:endParaRPr lang="en-US" sz="2400" dirty="0"/>
+          </a:p>
+          <a:p>
+            <a:pPr marL="800100" lvl="1" indent="-342900">
+              <a:buFont typeface="Arial" pitchFamily="34" charset="0"/>
+              <a:buChar char="•"/>
+            </a:pPr>
+            <a:r>
+              <a:rPr lang="en-US" sz="2400" dirty="0" smtClean="0"/>
+              <a:t>sphere</a:t>
+            </a:r>
+            <a:endParaRPr lang="en-US" sz="2400" dirty="0"/>
+          </a:p>
+          <a:p>
+            <a:pPr marL="800100" lvl="1" indent="-342900">
+              <a:buFont typeface="Arial" pitchFamily="34" charset="0"/>
+              <a:buChar char="•"/>
+            </a:pPr>
+            <a:r>
+              <a:rPr lang="en-US" sz="2400" dirty="0" smtClean="0"/>
+              <a:t>cylinder</a:t>
+            </a:r>
+            <a:endParaRPr lang="en-US" sz="2400" dirty="0"/>
+          </a:p>
+          <a:p>
+            <a:pPr marL="800100" lvl="1" indent="-342900">
+              <a:buFont typeface="Arial" pitchFamily="34" charset="0"/>
+              <a:buChar char="•"/>
+            </a:pPr>
+            <a:r>
+              <a:rPr lang="en-US" sz="2400" dirty="0" smtClean="0"/>
+              <a:t>distant</a:t>
+            </a:r>
+            <a:endParaRPr lang="en-US" sz="2400" dirty="0"/>
+          </a:p>
+          <a:p>
+            <a:pPr marL="800100" lvl="1" indent="-342900">
+              <a:buFont typeface="Arial" pitchFamily="34" charset="0"/>
+              <a:buChar char="•"/>
+            </a:pPr>
+            <a:r>
+              <a:rPr lang="en-US" sz="2400" dirty="0" smtClean="0"/>
+              <a:t>spot</a:t>
+            </a:r>
+            <a:endParaRPr lang="en-US" sz="2400" dirty="0"/>
+          </a:p>
+          <a:p>
+            <a:pPr marL="285750" indent="-285750">
+              <a:buFont typeface="Arial" pitchFamily="34" charset="0"/>
+              <a:buChar char="•"/>
+            </a:pPr>
+            <a:endParaRPr lang="en-US" sz="2400" dirty="0" smtClean="0"/>
+          </a:p>
+          <a:p>
+            <a:pPr marL="285750" indent="-285750">
+              <a:buFont typeface="Arial" pitchFamily="34" charset="0"/>
+              <a:buChar char="•"/>
+            </a:pPr>
+            <a:endParaRPr lang="en-US" sz="2400" dirty="0"/>
+          </a:p>
+        </p:txBody>
+      </p:sp>
+    </p:spTree>
+    <p:extLst>
+      <p:ext uri="{BB962C8B-B14F-4D97-AF65-F5344CB8AC3E}">
+        <p14:creationId xmlns:p14="http://schemas.microsoft.com/office/powerpoint/2010/main" val="3685513809"/>
+      </p:ext>
+    </p:extLst>
+  </p:cSld>
+  <p:clrMapOvr>
+    <a:masterClrMapping/>
+  </p:clrMapOvr>
+  <p:timing>
+    <p:tnLst>
+      <p:par>
+        <p:cTn id="1" dur="indefinite" restart="never" nodeType="tmRoot"/>
+      </p:par>
+    </p:tnLst>
+  </p:timing>
+</p:sld>
+</file>
+
+<file path=ppt/slides/slide21.xml><?xml version="1.0" encoding="utf-8"?>
+<p:sld xmlns:a="http://schemas.openxmlformats.org/drawingml/2006/main" xmlns:r="http://schemas.openxmlformats.org/officeDocument/2006/relationships" xmlns:p="http://schemas.openxmlformats.org/presentationml/2006/main">
+  <p:cSld>
+    <p:spTree>
+      <p:nvGrpSpPr>
+        <p:cNvPr id="1" name=""/>
+        <p:cNvGrpSpPr/>
+        <p:nvPr/>
+      </p:nvGrpSpPr>
+      <p:grpSpPr>
+        <a:xfrm>
+          <a:off x="0" y="0"/>
+          <a:ext cx="0" cy="0"/>
+          <a:chOff x="0" y="0"/>
+          <a:chExt cx="0" cy="0"/>
+        </a:xfrm>
+      </p:grpSpPr>
+      <p:sp>
+        <p:nvSpPr>
+          <p:cNvPr id="2" name="Title 1"/>
+          <p:cNvSpPr>
+            <a:spLocks noGrp="1"/>
+          </p:cNvSpPr>
+          <p:nvPr>
+            <p:ph type="ctrTitle"/>
+          </p:nvPr>
+        </p:nvSpPr>
+        <p:spPr>
+          <a:xfrm>
+            <a:off x="1909727" y="35560"/>
+            <a:ext cx="7772400" cy="1470025"/>
+          </a:xfrm>
+        </p:spPr>
+        <p:txBody>
+          <a:bodyPr/>
+          <a:lstStyle/>
+          <a:p>
+            <a:r>
+              <a:rPr lang="en-US" dirty="0" smtClean="0"/>
+              <a:t>Ray tracing settings</a:t>
+            </a:r>
+            <a:endParaRPr lang="en-US" dirty="0"/>
+          </a:p>
+        </p:txBody>
+      </p:sp>
+      <p:sp>
+        <p:nvSpPr>
+          <p:cNvPr id="4" name="Rectangle 3"/>
+          <p:cNvSpPr/>
+          <p:nvPr/>
+        </p:nvSpPr>
+        <p:spPr>
+          <a:xfrm>
+            <a:off x="1447800" y="1752598"/>
+            <a:ext cx="6705600" cy="1200329"/>
+          </a:xfrm>
+          <a:prstGeom prst="rect">
+            <a:avLst/>
+          </a:prstGeom>
+        </p:spPr>
+        <p:txBody>
+          <a:bodyPr wrap="square">
+            <a:spAutoFit/>
+          </a:bodyPr>
+          <a:lstStyle/>
+          <a:p>
+            <a:pPr marL="285750" indent="-285750">
+              <a:buFont typeface="Arial" pitchFamily="34" charset="0"/>
+              <a:buChar char="•"/>
+            </a:pPr>
+            <a:endParaRPr lang="en-US" sz="2400" dirty="0" smtClean="0"/>
+          </a:p>
+          <a:p>
+            <a:pPr marL="285750" indent="-285750">
+              <a:buFont typeface="Arial" pitchFamily="34" charset="0"/>
+              <a:buChar char="•"/>
+            </a:pPr>
+            <a:endParaRPr lang="en-US" sz="2400" dirty="0" smtClean="0"/>
+          </a:p>
+          <a:p>
+            <a:pPr marL="285750" indent="-285750">
+              <a:buFont typeface="Arial" pitchFamily="34" charset="0"/>
+              <a:buChar char="•"/>
+            </a:pPr>
+            <a:endParaRPr lang="en-US" sz="2400" dirty="0"/>
+          </a:p>
+        </p:txBody>
+      </p:sp>
+      <p:sp>
+        <p:nvSpPr>
+          <p:cNvPr id="5" name="Rectangle 4"/>
+          <p:cNvSpPr/>
+          <p:nvPr/>
+        </p:nvSpPr>
+        <p:spPr>
+          <a:xfrm>
+            <a:off x="1447800" y="1752598"/>
+            <a:ext cx="6705600" cy="830997"/>
+          </a:xfrm>
+          <a:prstGeom prst="rect">
+            <a:avLst/>
+          </a:prstGeom>
+        </p:spPr>
+        <p:txBody>
+          <a:bodyPr wrap="square">
+            <a:spAutoFit/>
+          </a:bodyPr>
+          <a:lstStyle/>
+          <a:p>
+            <a:pPr marL="285750" indent="-285750">
+              <a:buFont typeface="Arial" pitchFamily="34" charset="0"/>
+              <a:buChar char="•"/>
+            </a:pPr>
+            <a:endParaRPr lang="en-US" sz="2400" dirty="0" smtClean="0"/>
+          </a:p>
+          <a:p>
+            <a:pPr marL="285750" indent="-285750">
+              <a:buFont typeface="Arial" pitchFamily="34" charset="0"/>
+              <a:buChar char="•"/>
+            </a:pPr>
+            <a:endParaRPr lang="en-US" sz="2400" dirty="0"/>
+          </a:p>
+        </p:txBody>
+      </p:sp>
+      <p:sp>
+        <p:nvSpPr>
+          <p:cNvPr id="6" name="Rectangle 5"/>
+          <p:cNvSpPr/>
+          <p:nvPr/>
+        </p:nvSpPr>
+        <p:spPr>
+          <a:xfrm>
+            <a:off x="609600" y="2352762"/>
+            <a:ext cx="8382000" cy="1754326"/>
+          </a:xfrm>
+          <a:prstGeom prst="rect">
+            <a:avLst/>
+          </a:prstGeom>
+        </p:spPr>
+        <p:txBody>
+          <a:bodyPr wrap="square">
+            <a:spAutoFit/>
+          </a:bodyPr>
+          <a:lstStyle/>
+          <a:p>
+            <a:endParaRPr lang="en-US" dirty="0">
+              <a:latin typeface="Verdana" pitchFamily="34" charset="0"/>
+              <a:ea typeface="Verdana" pitchFamily="34" charset="0"/>
+              <a:cs typeface="Verdana" pitchFamily="34" charset="0"/>
+            </a:endParaRPr>
+          </a:p>
+          <a:p>
+            <a:r>
+              <a:rPr lang="en-US" dirty="0" err="1">
+                <a:latin typeface="Verdana" pitchFamily="34" charset="0"/>
+                <a:ea typeface="Verdana" pitchFamily="34" charset="0"/>
+                <a:cs typeface="Verdana" pitchFamily="34" charset="0"/>
+              </a:rPr>
+              <a:t>ri.Hider</a:t>
+            </a:r>
+            <a:r>
+              <a:rPr lang="en-US" dirty="0">
+                <a:latin typeface="Verdana" pitchFamily="34" charset="0"/>
+                <a:ea typeface="Verdana" pitchFamily="34" charset="0"/>
+                <a:cs typeface="Verdana" pitchFamily="34" charset="0"/>
+              </a:rPr>
+              <a:t>("</a:t>
+            </a:r>
+            <a:r>
+              <a:rPr lang="en-US" dirty="0" err="1">
+                <a:latin typeface="Verdana" pitchFamily="34" charset="0"/>
+                <a:ea typeface="Verdana" pitchFamily="34" charset="0"/>
+                <a:cs typeface="Verdana" pitchFamily="34" charset="0"/>
+              </a:rPr>
+              <a:t>raytrace</a:t>
+            </a:r>
+            <a:r>
+              <a:rPr lang="en-US" dirty="0">
+                <a:latin typeface="Verdana" pitchFamily="34" charset="0"/>
+                <a:ea typeface="Verdana" pitchFamily="34" charset="0"/>
+                <a:cs typeface="Verdana" pitchFamily="34" charset="0"/>
+              </a:rPr>
+              <a:t>", {"</a:t>
+            </a:r>
+            <a:r>
+              <a:rPr lang="en-US" dirty="0" err="1">
+                <a:latin typeface="Verdana" pitchFamily="34" charset="0"/>
+                <a:ea typeface="Verdana" pitchFamily="34" charset="0"/>
+                <a:cs typeface="Verdana" pitchFamily="34" charset="0"/>
+              </a:rPr>
+              <a:t>int</a:t>
+            </a:r>
+            <a:r>
+              <a:rPr lang="en-US" dirty="0">
+                <a:latin typeface="Verdana" pitchFamily="34" charset="0"/>
+                <a:ea typeface="Verdana" pitchFamily="34" charset="0"/>
+                <a:cs typeface="Verdana" pitchFamily="34" charset="0"/>
+              </a:rPr>
+              <a:t> incremental":1, "</a:t>
+            </a:r>
+            <a:r>
+              <a:rPr lang="en-US" dirty="0" err="1">
+                <a:latin typeface="Verdana" pitchFamily="34" charset="0"/>
+                <a:ea typeface="Verdana" pitchFamily="34" charset="0"/>
+                <a:cs typeface="Verdana" pitchFamily="34" charset="0"/>
+              </a:rPr>
+              <a:t>int</a:t>
+            </a:r>
+            <a:r>
+              <a:rPr lang="en-US" dirty="0">
+                <a:latin typeface="Verdana" pitchFamily="34" charset="0"/>
+                <a:ea typeface="Verdana" pitchFamily="34" charset="0"/>
+                <a:cs typeface="Verdana" pitchFamily="34" charset="0"/>
+              </a:rPr>
+              <a:t> maxsamples":100, "</a:t>
+            </a:r>
+            <a:r>
+              <a:rPr lang="en-US" dirty="0" err="1">
+                <a:latin typeface="Verdana" pitchFamily="34" charset="0"/>
+                <a:ea typeface="Verdana" pitchFamily="34" charset="0"/>
+                <a:cs typeface="Verdana" pitchFamily="34" charset="0"/>
+              </a:rPr>
+              <a:t>int</a:t>
+            </a:r>
+            <a:r>
+              <a:rPr lang="en-US" dirty="0">
+                <a:latin typeface="Verdana" pitchFamily="34" charset="0"/>
+                <a:ea typeface="Verdana" pitchFamily="34" charset="0"/>
+                <a:cs typeface="Verdana" pitchFamily="34" charset="0"/>
+              </a:rPr>
+              <a:t> </a:t>
+            </a:r>
+            <a:r>
+              <a:rPr lang="en-US" dirty="0" err="1">
+                <a:latin typeface="Verdana" pitchFamily="34" charset="0"/>
+                <a:ea typeface="Verdana" pitchFamily="34" charset="0"/>
+                <a:cs typeface="Verdana" pitchFamily="34" charset="0"/>
+              </a:rPr>
+              <a:t>minsamples</a:t>
+            </a:r>
+            <a:r>
+              <a:rPr lang="en-US" dirty="0">
+                <a:latin typeface="Verdana" pitchFamily="34" charset="0"/>
+                <a:ea typeface="Verdana" pitchFamily="34" charset="0"/>
+                <a:cs typeface="Verdana" pitchFamily="34" charset="0"/>
+              </a:rPr>
+              <a:t>": 25})</a:t>
+            </a:r>
+          </a:p>
+          <a:p>
+            <a:r>
+              <a:rPr lang="en-US" dirty="0" err="1">
+                <a:latin typeface="Verdana" pitchFamily="34" charset="0"/>
+                <a:ea typeface="Verdana" pitchFamily="34" charset="0"/>
+                <a:cs typeface="Verdana" pitchFamily="34" charset="0"/>
+              </a:rPr>
+              <a:t>ri.Integrator</a:t>
+            </a:r>
+            <a:r>
+              <a:rPr lang="en-US" dirty="0">
+                <a:latin typeface="Verdana" pitchFamily="34" charset="0"/>
+                <a:ea typeface="Verdana" pitchFamily="34" charset="0"/>
+                <a:cs typeface="Verdana" pitchFamily="34" charset="0"/>
+              </a:rPr>
+              <a:t>("</a:t>
+            </a:r>
+            <a:r>
+              <a:rPr lang="en-US" dirty="0" err="1">
+                <a:latin typeface="Verdana" pitchFamily="34" charset="0"/>
+                <a:ea typeface="Verdana" pitchFamily="34" charset="0"/>
+                <a:cs typeface="Verdana" pitchFamily="34" charset="0"/>
+              </a:rPr>
+              <a:t>PxrPathTracer</a:t>
+            </a:r>
+            <a:r>
+              <a:rPr lang="en-US" dirty="0">
+                <a:latin typeface="Verdana" pitchFamily="34" charset="0"/>
+                <a:ea typeface="Verdana" pitchFamily="34" charset="0"/>
+                <a:cs typeface="Verdana" pitchFamily="34" charset="0"/>
+              </a:rPr>
+              <a:t>", "</a:t>
+            </a:r>
+            <a:r>
+              <a:rPr lang="en-US" dirty="0" err="1">
+                <a:latin typeface="Verdana" pitchFamily="34" charset="0"/>
+                <a:ea typeface="Verdana" pitchFamily="34" charset="0"/>
+                <a:cs typeface="Verdana" pitchFamily="34" charset="0"/>
+              </a:rPr>
+              <a:t>ffo</a:t>
+            </a:r>
+            <a:r>
+              <a:rPr lang="en-US" dirty="0">
+                <a:latin typeface="Verdana" pitchFamily="34" charset="0"/>
+                <a:ea typeface="Verdana" pitchFamily="34" charset="0"/>
+                <a:cs typeface="Verdana" pitchFamily="34" charset="0"/>
+              </a:rPr>
+              <a:t>",</a:t>
+            </a:r>
+          </a:p>
+          <a:p>
+            <a:r>
+              <a:rPr lang="en-US" dirty="0">
+                <a:latin typeface="Verdana" pitchFamily="34" charset="0"/>
+                <a:ea typeface="Verdana" pitchFamily="34" charset="0"/>
+                <a:cs typeface="Verdana" pitchFamily="34" charset="0"/>
+              </a:rPr>
+              <a:t>                   {"</a:t>
+            </a:r>
+            <a:r>
+              <a:rPr lang="en-US" dirty="0" err="1">
+                <a:latin typeface="Verdana" pitchFamily="34" charset="0"/>
+                <a:ea typeface="Verdana" pitchFamily="34" charset="0"/>
+                <a:cs typeface="Verdana" pitchFamily="34" charset="0"/>
+              </a:rPr>
+              <a:t>int</a:t>
+            </a:r>
+            <a:r>
+              <a:rPr lang="en-US" dirty="0">
+                <a:latin typeface="Verdana" pitchFamily="34" charset="0"/>
+                <a:ea typeface="Verdana" pitchFamily="34" charset="0"/>
+                <a:cs typeface="Verdana" pitchFamily="34" charset="0"/>
+              </a:rPr>
+              <a:t> </a:t>
+            </a:r>
+            <a:r>
+              <a:rPr lang="en-US" dirty="0" err="1">
+                <a:latin typeface="Verdana" pitchFamily="34" charset="0"/>
+                <a:ea typeface="Verdana" pitchFamily="34" charset="0"/>
+                <a:cs typeface="Verdana" pitchFamily="34" charset="0"/>
+              </a:rPr>
+              <a:t>numLightSamples</a:t>
+            </a:r>
+            <a:r>
+              <a:rPr lang="en-US" dirty="0">
+                <a:latin typeface="Verdana" pitchFamily="34" charset="0"/>
+                <a:ea typeface="Verdana" pitchFamily="34" charset="0"/>
+                <a:cs typeface="Verdana" pitchFamily="34" charset="0"/>
+              </a:rPr>
+              <a:t>": 4, "</a:t>
+            </a:r>
+            <a:r>
+              <a:rPr lang="en-US" dirty="0" err="1">
+                <a:latin typeface="Verdana" pitchFamily="34" charset="0"/>
+                <a:ea typeface="Verdana" pitchFamily="34" charset="0"/>
+                <a:cs typeface="Verdana" pitchFamily="34" charset="0"/>
+              </a:rPr>
+              <a:t>int</a:t>
+            </a:r>
+            <a:r>
+              <a:rPr lang="en-US" dirty="0">
+                <a:latin typeface="Verdana" pitchFamily="34" charset="0"/>
+                <a:ea typeface="Verdana" pitchFamily="34" charset="0"/>
+                <a:cs typeface="Verdana" pitchFamily="34" charset="0"/>
+              </a:rPr>
+              <a:t> </a:t>
+            </a:r>
+            <a:r>
+              <a:rPr lang="en-US" dirty="0" err="1">
+                <a:latin typeface="Verdana" pitchFamily="34" charset="0"/>
+                <a:ea typeface="Verdana" pitchFamily="34" charset="0"/>
+                <a:cs typeface="Verdana" pitchFamily="34" charset="0"/>
+              </a:rPr>
+              <a:t>numBxdfSamples</a:t>
+            </a:r>
+            <a:r>
+              <a:rPr lang="en-US" dirty="0">
+                <a:latin typeface="Verdana" pitchFamily="34" charset="0"/>
+                <a:ea typeface="Verdana" pitchFamily="34" charset="0"/>
+                <a:cs typeface="Verdana" pitchFamily="34" charset="0"/>
+              </a:rPr>
+              <a:t>": 4,</a:t>
+            </a:r>
+          </a:p>
+          <a:p>
+            <a:r>
+              <a:rPr lang="en-US" dirty="0">
+                <a:latin typeface="Verdana" pitchFamily="34" charset="0"/>
+                <a:ea typeface="Verdana" pitchFamily="34" charset="0"/>
+                <a:cs typeface="Verdana" pitchFamily="34" charset="0"/>
+              </a:rPr>
+              <a:t>                    "</a:t>
+            </a:r>
+            <a:r>
+              <a:rPr lang="en-US" dirty="0" err="1">
+                <a:latin typeface="Verdana" pitchFamily="34" charset="0"/>
+                <a:ea typeface="Verdana" pitchFamily="34" charset="0"/>
+                <a:cs typeface="Verdana" pitchFamily="34" charset="0"/>
+              </a:rPr>
+              <a:t>int</a:t>
+            </a:r>
+            <a:r>
+              <a:rPr lang="en-US" dirty="0">
+                <a:latin typeface="Verdana" pitchFamily="34" charset="0"/>
+                <a:ea typeface="Verdana" pitchFamily="34" charset="0"/>
+                <a:cs typeface="Verdana" pitchFamily="34" charset="0"/>
+              </a:rPr>
+              <a:t> </a:t>
+            </a:r>
+            <a:r>
+              <a:rPr lang="en-US" dirty="0" err="1">
+                <a:latin typeface="Verdana" pitchFamily="34" charset="0"/>
+                <a:ea typeface="Verdana" pitchFamily="34" charset="0"/>
+                <a:cs typeface="Verdana" pitchFamily="34" charset="0"/>
+              </a:rPr>
+              <a:t>numIndirectSamples</a:t>
+            </a:r>
+            <a:r>
+              <a:rPr lang="en-US" dirty="0">
+                <a:latin typeface="Verdana" pitchFamily="34" charset="0"/>
+                <a:ea typeface="Verdana" pitchFamily="34" charset="0"/>
+                <a:cs typeface="Verdana" pitchFamily="34" charset="0"/>
+              </a:rPr>
+              <a:t>": 4, "</a:t>
+            </a:r>
+            <a:r>
+              <a:rPr lang="en-US" dirty="0" err="1">
+                <a:latin typeface="Verdana" pitchFamily="34" charset="0"/>
+                <a:ea typeface="Verdana" pitchFamily="34" charset="0"/>
+                <a:cs typeface="Verdana" pitchFamily="34" charset="0"/>
+              </a:rPr>
+              <a:t>int</a:t>
+            </a:r>
+            <a:r>
+              <a:rPr lang="en-US" dirty="0">
+                <a:latin typeface="Verdana" pitchFamily="34" charset="0"/>
+                <a:ea typeface="Verdana" pitchFamily="34" charset="0"/>
+                <a:cs typeface="Verdana" pitchFamily="34" charset="0"/>
+              </a:rPr>
+              <a:t> </a:t>
+            </a:r>
+            <a:r>
+              <a:rPr lang="en-US" dirty="0" err="1">
+                <a:latin typeface="Verdana" pitchFamily="34" charset="0"/>
+                <a:ea typeface="Verdana" pitchFamily="34" charset="0"/>
+                <a:cs typeface="Verdana" pitchFamily="34" charset="0"/>
+              </a:rPr>
+              <a:t>allowCaustics</a:t>
+            </a:r>
+            <a:r>
+              <a:rPr lang="en-US" dirty="0">
+                <a:latin typeface="Verdana" pitchFamily="34" charset="0"/>
+                <a:ea typeface="Verdana" pitchFamily="34" charset="0"/>
+                <a:cs typeface="Verdana" pitchFamily="34" charset="0"/>
+              </a:rPr>
+              <a:t>": 1})</a:t>
+            </a:r>
+          </a:p>
+        </p:txBody>
+      </p:sp>
+    </p:spTree>
+    <p:extLst>
+      <p:ext uri="{BB962C8B-B14F-4D97-AF65-F5344CB8AC3E}">
+        <p14:creationId xmlns:p14="http://schemas.microsoft.com/office/powerpoint/2010/main" val="1442958183"/>
+      </p:ext>
+    </p:extLst>
+  </p:cSld>
+  <p:clrMapOvr>
+    <a:masterClrMapping/>
+  </p:clrMapOvr>
+  <p:timing>
+    <p:tnLst>
+      <p:par>
+        <p:cTn id="1" dur="indefinite" restart="never" nodeType="tmRoot"/>
+      </p:par>
+    </p:tnLst>
+  </p:timing>
+</p:sld>
+</file>
+
+<file path=ppt/slides/slide22.xml><?xml version="1.0" encoding="utf-8"?>
+<p:sld xmlns:a="http://schemas.openxmlformats.org/drawingml/2006/main" xmlns:r="http://schemas.openxmlformats.org/officeDocument/2006/relationships" xmlns:p="http://schemas.openxmlformats.org/presentationml/2006/main">
+  <p:cSld>
+    <p:spTree>
+      <p:nvGrpSpPr>
+        <p:cNvPr id="1" name=""/>
+        <p:cNvGrpSpPr/>
+        <p:nvPr/>
+      </p:nvGrpSpPr>
+      <p:grpSpPr>
+        <a:xfrm>
+          <a:off x="0" y="0"/>
+          <a:ext cx="0" cy="0"/>
+          <a:chOff x="0" y="0"/>
+          <a:chExt cx="0" cy="0"/>
+        </a:xfrm>
+      </p:grpSpPr>
+      <p:sp>
+        <p:nvSpPr>
+          <p:cNvPr id="2" name="Title 1"/>
+          <p:cNvSpPr>
+            <a:spLocks noGrp="1"/>
+          </p:cNvSpPr>
+          <p:nvPr>
+            <p:ph type="ctrTitle"/>
+          </p:nvPr>
+        </p:nvSpPr>
+        <p:spPr>
+          <a:xfrm>
+            <a:off x="1909727" y="35560"/>
+            <a:ext cx="7772400" cy="1470025"/>
+          </a:xfrm>
+        </p:spPr>
+        <p:txBody>
+          <a:bodyPr/>
+          <a:lstStyle/>
+          <a:p>
+            <a:r>
+              <a:rPr lang="en-US" dirty="0" smtClean="0"/>
+              <a:t>Light and material</a:t>
+            </a:r>
+            <a:endParaRPr lang="en-US" dirty="0"/>
+          </a:p>
+        </p:txBody>
+      </p:sp>
+      <p:sp>
+        <p:nvSpPr>
+          <p:cNvPr id="4" name="Rectangle 3"/>
+          <p:cNvSpPr/>
+          <p:nvPr/>
+        </p:nvSpPr>
+        <p:spPr>
+          <a:xfrm>
+            <a:off x="1447800" y="1752598"/>
+            <a:ext cx="6705600" cy="1200329"/>
+          </a:xfrm>
+          <a:prstGeom prst="rect">
+            <a:avLst/>
+          </a:prstGeom>
+        </p:spPr>
+        <p:txBody>
+          <a:bodyPr wrap="square">
+            <a:spAutoFit/>
+          </a:bodyPr>
+          <a:lstStyle/>
+          <a:p>
+            <a:pPr marL="285750" indent="-285750">
+              <a:buFont typeface="Arial" pitchFamily="34" charset="0"/>
+              <a:buChar char="•"/>
+            </a:pPr>
+            <a:endParaRPr lang="en-US" sz="2400" dirty="0" smtClean="0"/>
+          </a:p>
+          <a:p>
+            <a:pPr marL="285750" indent="-285750">
+              <a:buFont typeface="Arial" pitchFamily="34" charset="0"/>
+              <a:buChar char="•"/>
+            </a:pPr>
+            <a:endParaRPr lang="en-US" sz="2400" dirty="0" smtClean="0"/>
+          </a:p>
+          <a:p>
+            <a:pPr marL="285750" indent="-285750">
+              <a:buFont typeface="Arial" pitchFamily="34" charset="0"/>
+              <a:buChar char="•"/>
+            </a:pPr>
+            <a:endParaRPr lang="en-US" sz="2400" dirty="0"/>
+          </a:p>
+        </p:txBody>
+      </p:sp>
+      <p:sp>
+        <p:nvSpPr>
+          <p:cNvPr id="5" name="Rectangle 4"/>
+          <p:cNvSpPr/>
+          <p:nvPr/>
+        </p:nvSpPr>
+        <p:spPr>
+          <a:xfrm>
+            <a:off x="1447800" y="1752598"/>
+            <a:ext cx="6705600" cy="830997"/>
+          </a:xfrm>
+          <a:prstGeom prst="rect">
+            <a:avLst/>
+          </a:prstGeom>
+        </p:spPr>
+        <p:txBody>
+          <a:bodyPr wrap="square">
+            <a:spAutoFit/>
+          </a:bodyPr>
+          <a:lstStyle/>
+          <a:p>
+            <a:pPr marL="285750" indent="-285750">
+              <a:buFont typeface="Arial" pitchFamily="34" charset="0"/>
+              <a:buChar char="•"/>
+            </a:pPr>
+            <a:endParaRPr lang="en-US" sz="2400" dirty="0" smtClean="0"/>
+          </a:p>
+          <a:p>
+            <a:pPr marL="285750" indent="-285750">
+              <a:buFont typeface="Arial" pitchFamily="34" charset="0"/>
+              <a:buChar char="•"/>
+            </a:pPr>
+            <a:endParaRPr lang="en-US" sz="2400" dirty="0"/>
+          </a:p>
+        </p:txBody>
+      </p:sp>
+      <p:sp>
+        <p:nvSpPr>
+          <p:cNvPr id="6" name="Rectangle 5"/>
+          <p:cNvSpPr/>
+          <p:nvPr/>
+        </p:nvSpPr>
+        <p:spPr>
+          <a:xfrm>
+            <a:off x="609600" y="2352762"/>
+            <a:ext cx="8382000" cy="1754326"/>
+          </a:xfrm>
+          <a:prstGeom prst="rect">
+            <a:avLst/>
+          </a:prstGeom>
+        </p:spPr>
+        <p:txBody>
+          <a:bodyPr wrap="square">
+            <a:spAutoFit/>
+          </a:bodyPr>
+          <a:lstStyle/>
+          <a:p>
+            <a:endParaRPr lang="en-US" dirty="0">
+              <a:latin typeface="Verdana" pitchFamily="34" charset="0"/>
+              <a:ea typeface="Verdana" pitchFamily="34" charset="0"/>
+              <a:cs typeface="Verdana" pitchFamily="34" charset="0"/>
+            </a:endParaRPr>
+          </a:p>
+          <a:p>
+            <a:r>
+              <a:rPr lang="en-US" dirty="0" err="1">
+                <a:latin typeface="Verdana" pitchFamily="34" charset="0"/>
+                <a:ea typeface="Verdana" pitchFamily="34" charset="0"/>
+                <a:cs typeface="Verdana" pitchFamily="34" charset="0"/>
+              </a:rPr>
+              <a:t>ri.Hider</a:t>
+            </a:r>
+            <a:r>
+              <a:rPr lang="en-US" dirty="0">
+                <a:latin typeface="Verdana" pitchFamily="34" charset="0"/>
+                <a:ea typeface="Verdana" pitchFamily="34" charset="0"/>
+                <a:cs typeface="Verdana" pitchFamily="34" charset="0"/>
+              </a:rPr>
+              <a:t>("</a:t>
+            </a:r>
+            <a:r>
+              <a:rPr lang="en-US" dirty="0" err="1">
+                <a:latin typeface="Verdana" pitchFamily="34" charset="0"/>
+                <a:ea typeface="Verdana" pitchFamily="34" charset="0"/>
+                <a:cs typeface="Verdana" pitchFamily="34" charset="0"/>
+              </a:rPr>
+              <a:t>raytrace</a:t>
+            </a:r>
+            <a:r>
+              <a:rPr lang="en-US" dirty="0">
+                <a:latin typeface="Verdana" pitchFamily="34" charset="0"/>
+                <a:ea typeface="Verdana" pitchFamily="34" charset="0"/>
+                <a:cs typeface="Verdana" pitchFamily="34" charset="0"/>
+              </a:rPr>
+              <a:t>", {"</a:t>
+            </a:r>
+            <a:r>
+              <a:rPr lang="en-US" dirty="0" err="1">
+                <a:latin typeface="Verdana" pitchFamily="34" charset="0"/>
+                <a:ea typeface="Verdana" pitchFamily="34" charset="0"/>
+                <a:cs typeface="Verdana" pitchFamily="34" charset="0"/>
+              </a:rPr>
+              <a:t>int</a:t>
+            </a:r>
+            <a:r>
+              <a:rPr lang="en-US" dirty="0">
+                <a:latin typeface="Verdana" pitchFamily="34" charset="0"/>
+                <a:ea typeface="Verdana" pitchFamily="34" charset="0"/>
+                <a:cs typeface="Verdana" pitchFamily="34" charset="0"/>
+              </a:rPr>
+              <a:t> incremental":1, "</a:t>
+            </a:r>
+            <a:r>
+              <a:rPr lang="en-US" dirty="0" err="1">
+                <a:latin typeface="Verdana" pitchFamily="34" charset="0"/>
+                <a:ea typeface="Verdana" pitchFamily="34" charset="0"/>
+                <a:cs typeface="Verdana" pitchFamily="34" charset="0"/>
+              </a:rPr>
+              <a:t>int</a:t>
+            </a:r>
+            <a:r>
+              <a:rPr lang="en-US" dirty="0">
+                <a:latin typeface="Verdana" pitchFamily="34" charset="0"/>
+                <a:ea typeface="Verdana" pitchFamily="34" charset="0"/>
+                <a:cs typeface="Verdana" pitchFamily="34" charset="0"/>
+              </a:rPr>
+              <a:t> maxsamples":100, "</a:t>
+            </a:r>
+            <a:r>
+              <a:rPr lang="en-US" dirty="0" err="1">
+                <a:latin typeface="Verdana" pitchFamily="34" charset="0"/>
+                <a:ea typeface="Verdana" pitchFamily="34" charset="0"/>
+                <a:cs typeface="Verdana" pitchFamily="34" charset="0"/>
+              </a:rPr>
+              <a:t>int</a:t>
+            </a:r>
+            <a:r>
+              <a:rPr lang="en-US" dirty="0">
+                <a:latin typeface="Verdana" pitchFamily="34" charset="0"/>
+                <a:ea typeface="Verdana" pitchFamily="34" charset="0"/>
+                <a:cs typeface="Verdana" pitchFamily="34" charset="0"/>
+              </a:rPr>
+              <a:t> </a:t>
+            </a:r>
+            <a:r>
+              <a:rPr lang="en-US" dirty="0" err="1">
+                <a:latin typeface="Verdana" pitchFamily="34" charset="0"/>
+                <a:ea typeface="Verdana" pitchFamily="34" charset="0"/>
+                <a:cs typeface="Verdana" pitchFamily="34" charset="0"/>
+              </a:rPr>
+              <a:t>minsamples</a:t>
+            </a:r>
+            <a:r>
+              <a:rPr lang="en-US" dirty="0">
+                <a:latin typeface="Verdana" pitchFamily="34" charset="0"/>
+                <a:ea typeface="Verdana" pitchFamily="34" charset="0"/>
+                <a:cs typeface="Verdana" pitchFamily="34" charset="0"/>
+              </a:rPr>
+              <a:t>": 25})</a:t>
+            </a:r>
+          </a:p>
+          <a:p>
+            <a:r>
+              <a:rPr lang="en-US" dirty="0" err="1">
+                <a:latin typeface="Verdana" pitchFamily="34" charset="0"/>
+                <a:ea typeface="Verdana" pitchFamily="34" charset="0"/>
+                <a:cs typeface="Verdana" pitchFamily="34" charset="0"/>
+              </a:rPr>
+              <a:t>ri.Integrator</a:t>
+            </a:r>
+            <a:r>
+              <a:rPr lang="en-US" dirty="0">
+                <a:latin typeface="Verdana" pitchFamily="34" charset="0"/>
+                <a:ea typeface="Verdana" pitchFamily="34" charset="0"/>
+                <a:cs typeface="Verdana" pitchFamily="34" charset="0"/>
+              </a:rPr>
+              <a:t>("</a:t>
+            </a:r>
+            <a:r>
+              <a:rPr lang="en-US" dirty="0" err="1">
+                <a:latin typeface="Verdana" pitchFamily="34" charset="0"/>
+                <a:ea typeface="Verdana" pitchFamily="34" charset="0"/>
+                <a:cs typeface="Verdana" pitchFamily="34" charset="0"/>
+              </a:rPr>
+              <a:t>PxrPathTracer</a:t>
+            </a:r>
+            <a:r>
+              <a:rPr lang="en-US" dirty="0">
+                <a:latin typeface="Verdana" pitchFamily="34" charset="0"/>
+                <a:ea typeface="Verdana" pitchFamily="34" charset="0"/>
+                <a:cs typeface="Verdana" pitchFamily="34" charset="0"/>
+              </a:rPr>
+              <a:t>", "</a:t>
+            </a:r>
+            <a:r>
+              <a:rPr lang="en-US" dirty="0" err="1">
+                <a:latin typeface="Verdana" pitchFamily="34" charset="0"/>
+                <a:ea typeface="Verdana" pitchFamily="34" charset="0"/>
+                <a:cs typeface="Verdana" pitchFamily="34" charset="0"/>
+              </a:rPr>
+              <a:t>ffo</a:t>
+            </a:r>
+            <a:r>
+              <a:rPr lang="en-US" dirty="0">
+                <a:latin typeface="Verdana" pitchFamily="34" charset="0"/>
+                <a:ea typeface="Verdana" pitchFamily="34" charset="0"/>
+                <a:cs typeface="Verdana" pitchFamily="34" charset="0"/>
+              </a:rPr>
+              <a:t>",</a:t>
+            </a:r>
+          </a:p>
+          <a:p>
+            <a:r>
+              <a:rPr lang="en-US" dirty="0">
+                <a:latin typeface="Verdana" pitchFamily="34" charset="0"/>
+                <a:ea typeface="Verdana" pitchFamily="34" charset="0"/>
+                <a:cs typeface="Verdana" pitchFamily="34" charset="0"/>
+              </a:rPr>
+              <a:t>                   {"</a:t>
+            </a:r>
+            <a:r>
+              <a:rPr lang="en-US" dirty="0" err="1">
+                <a:latin typeface="Verdana" pitchFamily="34" charset="0"/>
+                <a:ea typeface="Verdana" pitchFamily="34" charset="0"/>
+                <a:cs typeface="Verdana" pitchFamily="34" charset="0"/>
+              </a:rPr>
+              <a:t>int</a:t>
+            </a:r>
+            <a:r>
+              <a:rPr lang="en-US" dirty="0">
+                <a:latin typeface="Verdana" pitchFamily="34" charset="0"/>
+                <a:ea typeface="Verdana" pitchFamily="34" charset="0"/>
+                <a:cs typeface="Verdana" pitchFamily="34" charset="0"/>
+              </a:rPr>
+              <a:t> </a:t>
+            </a:r>
+            <a:r>
+              <a:rPr lang="en-US" dirty="0" err="1">
+                <a:latin typeface="Verdana" pitchFamily="34" charset="0"/>
+                <a:ea typeface="Verdana" pitchFamily="34" charset="0"/>
+                <a:cs typeface="Verdana" pitchFamily="34" charset="0"/>
+              </a:rPr>
+              <a:t>numLightSamples</a:t>
+            </a:r>
+            <a:r>
+              <a:rPr lang="en-US" dirty="0">
+                <a:latin typeface="Verdana" pitchFamily="34" charset="0"/>
+                <a:ea typeface="Verdana" pitchFamily="34" charset="0"/>
+                <a:cs typeface="Verdana" pitchFamily="34" charset="0"/>
+              </a:rPr>
+              <a:t>": 4, "</a:t>
+            </a:r>
+            <a:r>
+              <a:rPr lang="en-US" dirty="0" err="1">
+                <a:latin typeface="Verdana" pitchFamily="34" charset="0"/>
+                <a:ea typeface="Verdana" pitchFamily="34" charset="0"/>
+                <a:cs typeface="Verdana" pitchFamily="34" charset="0"/>
+              </a:rPr>
+              <a:t>int</a:t>
+            </a:r>
+            <a:r>
+              <a:rPr lang="en-US" dirty="0">
+                <a:latin typeface="Verdana" pitchFamily="34" charset="0"/>
+                <a:ea typeface="Verdana" pitchFamily="34" charset="0"/>
+                <a:cs typeface="Verdana" pitchFamily="34" charset="0"/>
+              </a:rPr>
+              <a:t> </a:t>
+            </a:r>
+            <a:r>
+              <a:rPr lang="en-US" dirty="0" err="1">
+                <a:latin typeface="Verdana" pitchFamily="34" charset="0"/>
+                <a:ea typeface="Verdana" pitchFamily="34" charset="0"/>
+                <a:cs typeface="Verdana" pitchFamily="34" charset="0"/>
+              </a:rPr>
+              <a:t>numBxdfSamples</a:t>
+            </a:r>
+            <a:r>
+              <a:rPr lang="en-US" dirty="0">
+                <a:latin typeface="Verdana" pitchFamily="34" charset="0"/>
+                <a:ea typeface="Verdana" pitchFamily="34" charset="0"/>
+                <a:cs typeface="Verdana" pitchFamily="34" charset="0"/>
+              </a:rPr>
+              <a:t>": 4,</a:t>
+            </a:r>
+          </a:p>
+          <a:p>
+            <a:r>
+              <a:rPr lang="en-US" dirty="0">
+                <a:latin typeface="Verdana" pitchFamily="34" charset="0"/>
+                <a:ea typeface="Verdana" pitchFamily="34" charset="0"/>
+                <a:cs typeface="Verdana" pitchFamily="34" charset="0"/>
+              </a:rPr>
+              <a:t>                    "</a:t>
+            </a:r>
+            <a:r>
+              <a:rPr lang="en-US" dirty="0" err="1">
+                <a:latin typeface="Verdana" pitchFamily="34" charset="0"/>
+                <a:ea typeface="Verdana" pitchFamily="34" charset="0"/>
+                <a:cs typeface="Verdana" pitchFamily="34" charset="0"/>
+              </a:rPr>
+              <a:t>int</a:t>
+            </a:r>
+            <a:r>
+              <a:rPr lang="en-US" dirty="0">
+                <a:latin typeface="Verdana" pitchFamily="34" charset="0"/>
+                <a:ea typeface="Verdana" pitchFamily="34" charset="0"/>
+                <a:cs typeface="Verdana" pitchFamily="34" charset="0"/>
+              </a:rPr>
+              <a:t> </a:t>
+            </a:r>
+            <a:r>
+              <a:rPr lang="en-US" dirty="0" err="1">
+                <a:latin typeface="Verdana" pitchFamily="34" charset="0"/>
+                <a:ea typeface="Verdana" pitchFamily="34" charset="0"/>
+                <a:cs typeface="Verdana" pitchFamily="34" charset="0"/>
+              </a:rPr>
+              <a:t>numIndirectSamples</a:t>
+            </a:r>
+            <a:r>
+              <a:rPr lang="en-US" dirty="0">
+                <a:latin typeface="Verdana" pitchFamily="34" charset="0"/>
+                <a:ea typeface="Verdana" pitchFamily="34" charset="0"/>
+                <a:cs typeface="Verdana" pitchFamily="34" charset="0"/>
+              </a:rPr>
+              <a:t>": 4, "</a:t>
+            </a:r>
+            <a:r>
+              <a:rPr lang="en-US" dirty="0" err="1">
+                <a:latin typeface="Verdana" pitchFamily="34" charset="0"/>
+                <a:ea typeface="Verdana" pitchFamily="34" charset="0"/>
+                <a:cs typeface="Verdana" pitchFamily="34" charset="0"/>
+              </a:rPr>
+              <a:t>int</a:t>
+            </a:r>
+            <a:r>
+              <a:rPr lang="en-US" dirty="0">
+                <a:latin typeface="Verdana" pitchFamily="34" charset="0"/>
+                <a:ea typeface="Verdana" pitchFamily="34" charset="0"/>
+                <a:cs typeface="Verdana" pitchFamily="34" charset="0"/>
+              </a:rPr>
+              <a:t> </a:t>
+            </a:r>
+            <a:r>
+              <a:rPr lang="en-US" dirty="0" err="1">
+                <a:latin typeface="Verdana" pitchFamily="34" charset="0"/>
+                <a:ea typeface="Verdana" pitchFamily="34" charset="0"/>
+                <a:cs typeface="Verdana" pitchFamily="34" charset="0"/>
+              </a:rPr>
+              <a:t>allowCaustics</a:t>
+            </a:r>
+            <a:r>
+              <a:rPr lang="en-US" dirty="0">
+                <a:latin typeface="Verdana" pitchFamily="34" charset="0"/>
+                <a:ea typeface="Verdana" pitchFamily="34" charset="0"/>
+                <a:cs typeface="Verdana" pitchFamily="34" charset="0"/>
+              </a:rPr>
+              <a:t>": 1})</a:t>
+            </a:r>
+          </a:p>
+        </p:txBody>
+      </p:sp>
+    </p:spTree>
+    <p:extLst>
+      <p:ext uri="{BB962C8B-B14F-4D97-AF65-F5344CB8AC3E}">
+        <p14:creationId xmlns:p14="http://schemas.microsoft.com/office/powerpoint/2010/main" val="3460889597"/>
+      </p:ext>
+    </p:extLst>
+  </p:cSld>
+  <p:clrMapOvr>
+    <a:masterClrMapping/>
+  </p:clrMapOvr>
+  <p:timing>
+    <p:tnLst>
+      <p:par>
+        <p:cTn id="1" dur="indefinite" restart="never" nodeType="tmRoot"/>
+      </p:par>
+    </p:tnLst>
+  </p:timing>
+</p:sld>
+</file>
+
+<file path=ppt/slides/slide23.xml><?xml version="1.0" encoding="utf-8"?>
+<p:sld xmlns:a="http://schemas.openxmlformats.org/drawingml/2006/main" xmlns:r="http://schemas.openxmlformats.org/officeDocument/2006/relationships" xmlns:p="http://schemas.openxmlformats.org/presentationml/2006/main">
+  <p:cSld>
+    <p:spTree>
+      <p:nvGrpSpPr>
+        <p:cNvPr id="1" name=""/>
+        <p:cNvGrpSpPr/>
+        <p:nvPr/>
+      </p:nvGrpSpPr>
+      <p:grpSpPr>
+        <a:xfrm>
+          <a:off x="0" y="0"/>
+          <a:ext cx="0" cy="0"/>
+          <a:chOff x="0" y="0"/>
+          <a:chExt cx="0" cy="0"/>
+        </a:xfrm>
+      </p:grpSpPr>
+      <p:sp>
+        <p:nvSpPr>
+          <p:cNvPr id="2" name="Title 1"/>
+          <p:cNvSpPr>
+            <a:spLocks noGrp="1"/>
+          </p:cNvSpPr>
+          <p:nvPr>
+            <p:ph type="ctrTitle"/>
+          </p:nvPr>
+        </p:nvSpPr>
+        <p:spPr>
+          <a:xfrm>
+            <a:off x="1909727" y="35560"/>
+            <a:ext cx="7772400" cy="1470025"/>
+          </a:xfrm>
+        </p:spPr>
+        <p:txBody>
+          <a:bodyPr/>
+          <a:lstStyle/>
+          <a:p>
+            <a:r>
               <a:rPr lang="en-US" dirty="0" smtClean="0"/>
               <a:t>Any questions</a:t>
             </a:r>
@@ -6203,7 +9273,7 @@
 </p:sld>
 </file>
 
-<file path=ppt/slides/slide18.xml><?xml version="1.0" encoding="utf-8"?>
+<file path=ppt/slides/slide24.xml><?xml version="1.0" encoding="utf-8"?>
 <p:sld xmlns:a="http://schemas.openxmlformats.org/drawingml/2006/main" xmlns:r="http://schemas.openxmlformats.org/officeDocument/2006/relationships" xmlns:p="http://schemas.openxmlformats.org/presentationml/2006/main">
   <p:cSld>
     <p:spTree>
@@ -6345,207 +9415,6 @@
     <p:extLst>
       <p:ext uri="{BB962C8B-B14F-4D97-AF65-F5344CB8AC3E}">
         <p14:creationId xmlns:p14="http://schemas.microsoft.com/office/powerpoint/2010/main" val="408127098"/>
-      </p:ext>
-    </p:extLst>
-  </p:cSld>
-  <p:clrMapOvr>
-    <a:masterClrMapping/>
-  </p:clrMapOvr>
-  <p:timing>
-    <p:tnLst>
-      <p:par>
-        <p:cTn id="1" dur="indefinite" restart="never" nodeType="tmRoot"/>
-      </p:par>
-    </p:tnLst>
-  </p:timing>
-</p:sld>
-</file>
-
-<file path=ppt/slides/slide2.xml><?xml version="1.0" encoding="utf-8"?>
-<p:sld xmlns:a="http://schemas.openxmlformats.org/drawingml/2006/main" xmlns:r="http://schemas.openxmlformats.org/officeDocument/2006/relationships" xmlns:p="http://schemas.openxmlformats.org/presentationml/2006/main">
-  <p:cSld>
-    <p:spTree>
-      <p:nvGrpSpPr>
-        <p:cNvPr id="1" name=""/>
-        <p:cNvGrpSpPr/>
-        <p:nvPr/>
-      </p:nvGrpSpPr>
-      <p:grpSpPr>
-        <a:xfrm>
-          <a:off x="0" y="0"/>
-          <a:ext cx="0" cy="0"/>
-          <a:chOff x="0" y="0"/>
-          <a:chExt cx="0" cy="0"/>
-        </a:xfrm>
-      </p:grpSpPr>
-      <p:sp>
-        <p:nvSpPr>
-          <p:cNvPr id="2" name="Title 1"/>
-          <p:cNvSpPr>
-            <a:spLocks noGrp="1"/>
-          </p:cNvSpPr>
-          <p:nvPr>
-            <p:ph type="ctrTitle"/>
-          </p:nvPr>
-        </p:nvSpPr>
-        <p:spPr>
-          <a:xfrm>
-            <a:off x="1909727" y="35560"/>
-            <a:ext cx="7772400" cy="1470025"/>
-          </a:xfrm>
-        </p:spPr>
-        <p:txBody>
-          <a:bodyPr/>
-          <a:lstStyle/>
-          <a:p>
-            <a:r>
-              <a:rPr lang="en-US" dirty="0" smtClean="0"/>
-              <a:t>Prerequisites</a:t>
-            </a:r>
-            <a:endParaRPr lang="en-US" dirty="0"/>
-          </a:p>
-        </p:txBody>
-      </p:sp>
-      <p:sp>
-        <p:nvSpPr>
-          <p:cNvPr id="3" name="Rectangle 2"/>
-          <p:cNvSpPr/>
-          <p:nvPr/>
-        </p:nvSpPr>
-        <p:spPr>
-          <a:xfrm>
-            <a:off x="762000" y="2057400"/>
-            <a:ext cx="8382000" cy="3416320"/>
-          </a:xfrm>
-          <a:prstGeom prst="rect">
-            <a:avLst/>
-          </a:prstGeom>
-        </p:spPr>
-        <p:txBody>
-          <a:bodyPr wrap="square">
-            <a:spAutoFit/>
-          </a:bodyPr>
-          <a:lstStyle/>
-          <a:p>
-            <a:pPr marL="285750" indent="-285750">
-              <a:buFont typeface="Arial" pitchFamily="34" charset="0"/>
-              <a:buChar char="•"/>
-            </a:pPr>
-            <a:r>
-              <a:rPr lang="en-US" sz="2400" dirty="0" smtClean="0"/>
-              <a:t>Go to: </a:t>
-            </a:r>
-            <a:r>
-              <a:rPr lang="en-US" sz="2400" dirty="0" smtClean="0">
-                <a:hlinkClick r:id="rId2"/>
-              </a:rPr>
-              <a:t>https://renderman.pixar.com/view/get-renderman</a:t>
-            </a:r>
-            <a:endParaRPr lang="en-US" sz="2400" dirty="0" smtClean="0"/>
-          </a:p>
-          <a:p>
-            <a:pPr marL="285750" indent="-285750">
-              <a:buFont typeface="Arial" pitchFamily="34" charset="0"/>
-              <a:buChar char="•"/>
-            </a:pPr>
-            <a:r>
-              <a:rPr lang="en-US" sz="2400" dirty="0" smtClean="0"/>
-              <a:t>Click next and select </a:t>
-            </a:r>
-            <a:r>
-              <a:rPr lang="en-US" sz="2400" i="1" dirty="0" smtClean="0"/>
-              <a:t>Create a </a:t>
-            </a:r>
-            <a:r>
-              <a:rPr lang="en-US" sz="2400" i="1" dirty="0" err="1" smtClean="0"/>
-              <a:t>RenderMan</a:t>
-            </a:r>
-            <a:r>
-              <a:rPr lang="en-US" sz="2400" i="1" dirty="0" smtClean="0"/>
-              <a:t> Forums Account</a:t>
-            </a:r>
-            <a:r>
-              <a:rPr lang="en-US" sz="2400" dirty="0" smtClean="0"/>
-              <a:t> create an account</a:t>
-            </a:r>
-          </a:p>
-          <a:p>
-            <a:pPr marL="285750" indent="-285750">
-              <a:buFont typeface="Arial" pitchFamily="34" charset="0"/>
-              <a:buChar char="•"/>
-            </a:pPr>
-            <a:r>
-              <a:rPr lang="en-US" sz="2400" dirty="0" smtClean="0"/>
-              <a:t>Agree to terms and fill in registration form </a:t>
-            </a:r>
-          </a:p>
-          <a:p>
-            <a:pPr marL="285750" indent="-285750">
-              <a:buFont typeface="Arial" pitchFamily="34" charset="0"/>
-              <a:buChar char="•"/>
-            </a:pPr>
-            <a:r>
-              <a:rPr lang="en-US" sz="2400" dirty="0" smtClean="0"/>
-              <a:t>Click on link in email</a:t>
-            </a:r>
-          </a:p>
-          <a:p>
-            <a:pPr marL="285750" indent="-285750">
-              <a:buFont typeface="Arial" pitchFamily="34" charset="0"/>
-              <a:buChar char="•"/>
-            </a:pPr>
-            <a:r>
-              <a:rPr lang="en-US" sz="2400" dirty="0" smtClean="0"/>
-              <a:t>Go back to the </a:t>
-            </a:r>
-            <a:r>
-              <a:rPr lang="en-US" sz="2400" i="1" dirty="0" smtClean="0"/>
-              <a:t>Get </a:t>
-            </a:r>
-            <a:r>
-              <a:rPr lang="en-US" sz="2400" i="1" dirty="0" err="1" smtClean="0"/>
-              <a:t>RenderMan</a:t>
-            </a:r>
-            <a:r>
-              <a:rPr lang="en-US" sz="2400" i="1" dirty="0" smtClean="0"/>
-              <a:t> </a:t>
-            </a:r>
-            <a:r>
-              <a:rPr lang="en-US" sz="2400" dirty="0" smtClean="0"/>
-              <a:t>page after logging in</a:t>
-            </a:r>
-          </a:p>
-          <a:p>
-            <a:pPr marL="285750" indent="-285750">
-              <a:buFont typeface="Arial" pitchFamily="34" charset="0"/>
-              <a:buChar char="•"/>
-            </a:pPr>
-            <a:r>
-              <a:rPr lang="en-US" sz="2400" dirty="0" smtClean="0"/>
-              <a:t>Fill in form and go to download link (</a:t>
-            </a:r>
-            <a:r>
-              <a:rPr lang="en-US" sz="2400" dirty="0" err="1" smtClean="0"/>
-              <a:t>RenderMan</a:t>
-            </a:r>
-            <a:r>
-              <a:rPr lang="en-US" sz="2400" dirty="0" smtClean="0"/>
-              <a:t> Server is the component we are interested in)</a:t>
-            </a:r>
-          </a:p>
-          <a:p>
-            <a:pPr marL="285750" indent="-285750">
-              <a:buFont typeface="Arial" pitchFamily="34" charset="0"/>
-              <a:buChar char="•"/>
-            </a:pPr>
-            <a:endParaRPr lang="en-US" sz="2400" dirty="0"/>
-          </a:p>
-        </p:txBody>
-      </p:sp>
-    </p:spTree>
-    <p:extLst>
-      <p:ext uri="{BB962C8B-B14F-4D97-AF65-F5344CB8AC3E}">
-        <p14:creationId xmlns:p14="http://schemas.microsoft.com/office/powerpoint/2010/main" val="3011564685"/>
       </p:ext>
     </p:extLst>
   </p:cSld>

</xml_diff>